<commit_message>
update SF training + "pourquoi symfony2"
</commit_message>
<xml_diff>
--- a/slides/pourquoi-symfony-silex/img/schemas.pptx
+++ b/slides/pourquoi-symfony-silex/img/schemas.pptx
@@ -116,788 +116,6 @@
 </file>
 
 <file path=ppt/diagrams/colors1.xml><?xml version="1.0" encoding="utf-8"?>
-<dgm:colorsDef xmlns:dgm="http://schemas.openxmlformats.org/drawingml/2006/diagram" xmlns:a="http://schemas.openxmlformats.org/drawingml/2006/main" uniqueId="urn:microsoft.com/office/officeart/2005/8/colors/colorful3">
-  <dgm:title val=""/>
-  <dgm:desc val=""/>
-  <dgm:catLst>
-    <dgm:cat type="colorful" pri="10300"/>
-  </dgm:catLst>
-  <dgm:styleLbl name="node0">
-    <dgm:fillClrLst meth="repeat">
-      <a:schemeClr val="accent2"/>
-    </dgm:fillClrLst>
-    <dgm:linClrLst meth="repeat">
-      <a:schemeClr val="lt1"/>
-    </dgm:linClrLst>
-    <dgm:effectClrLst/>
-    <dgm:txLinClrLst/>
-    <dgm:txFillClrLst/>
-    <dgm:txEffectClrLst/>
-  </dgm:styleLbl>
-  <dgm:styleLbl name="node1">
-    <dgm:fillClrLst>
-      <a:schemeClr val="accent3"/>
-      <a:schemeClr val="accent4"/>
-    </dgm:fillClrLst>
-    <dgm:linClrLst meth="repeat">
-      <a:schemeClr val="lt1"/>
-    </dgm:linClrLst>
-    <dgm:effectClrLst/>
-    <dgm:txLinClrLst/>
-    <dgm:txFillClrLst/>
-    <dgm:txEffectClrLst/>
-  </dgm:styleLbl>
-  <dgm:styleLbl name="alignNode1">
-    <dgm:fillClrLst>
-      <a:schemeClr val="accent3"/>
-      <a:schemeClr val="accent4"/>
-    </dgm:fillClrLst>
-    <dgm:linClrLst>
-      <a:schemeClr val="accent3"/>
-      <a:schemeClr val="accent4"/>
-    </dgm:linClrLst>
-    <dgm:effectClrLst/>
-    <dgm:txLinClrLst/>
-    <dgm:txFillClrLst/>
-    <dgm:txEffectClrLst/>
-  </dgm:styleLbl>
-  <dgm:styleLbl name="lnNode1">
-    <dgm:fillClrLst>
-      <a:schemeClr val="accent3"/>
-      <a:schemeClr val="accent4"/>
-    </dgm:fillClrLst>
-    <dgm:linClrLst meth="repeat">
-      <a:schemeClr val="lt1"/>
-    </dgm:linClrLst>
-    <dgm:effectClrLst/>
-    <dgm:txLinClrLst/>
-    <dgm:txFillClrLst/>
-    <dgm:txEffectClrLst/>
-  </dgm:styleLbl>
-  <dgm:styleLbl name="vennNode1">
-    <dgm:fillClrLst>
-      <a:schemeClr val="accent3">
-        <a:alpha val="50000"/>
-      </a:schemeClr>
-      <a:schemeClr val="accent4">
-        <a:alpha val="50000"/>
-      </a:schemeClr>
-    </dgm:fillClrLst>
-    <dgm:linClrLst meth="repeat">
-      <a:schemeClr val="lt1"/>
-    </dgm:linClrLst>
-    <dgm:effectClrLst/>
-    <dgm:txLinClrLst/>
-    <dgm:txFillClrLst/>
-    <dgm:txEffectClrLst/>
-  </dgm:styleLbl>
-  <dgm:styleLbl name="node2">
-    <dgm:fillClrLst>
-      <a:schemeClr val="accent4"/>
-    </dgm:fillClrLst>
-    <dgm:linClrLst meth="repeat">
-      <a:schemeClr val="lt1"/>
-    </dgm:linClrLst>
-    <dgm:effectClrLst/>
-    <dgm:txLinClrLst/>
-    <dgm:txFillClrLst/>
-    <dgm:txEffectClrLst/>
-  </dgm:styleLbl>
-  <dgm:styleLbl name="node3">
-    <dgm:fillClrLst>
-      <a:schemeClr val="accent5"/>
-    </dgm:fillClrLst>
-    <dgm:linClrLst meth="repeat">
-      <a:schemeClr val="lt1"/>
-    </dgm:linClrLst>
-    <dgm:effectClrLst/>
-    <dgm:txLinClrLst/>
-    <dgm:txFillClrLst/>
-    <dgm:txEffectClrLst/>
-  </dgm:styleLbl>
-  <dgm:styleLbl name="node4">
-    <dgm:fillClrLst>
-      <a:schemeClr val="accent6"/>
-    </dgm:fillClrLst>
-    <dgm:linClrLst meth="repeat">
-      <a:schemeClr val="lt1"/>
-    </dgm:linClrLst>
-    <dgm:effectClrLst/>
-    <dgm:txLinClrLst/>
-    <dgm:txFillClrLst/>
-    <dgm:txEffectClrLst/>
-  </dgm:styleLbl>
-  <dgm:styleLbl name="fgImgPlace1">
-    <dgm:fillClrLst>
-      <a:schemeClr val="accent3">
-        <a:tint val="50000"/>
-      </a:schemeClr>
-      <a:schemeClr val="accent4">
-        <a:tint val="50000"/>
-      </a:schemeClr>
-    </dgm:fillClrLst>
-    <dgm:linClrLst meth="repeat">
-      <a:schemeClr val="lt1"/>
-    </dgm:linClrLst>
-    <dgm:effectClrLst/>
-    <dgm:txLinClrLst/>
-    <dgm:txFillClrLst meth="repeat">
-      <a:schemeClr val="lt1"/>
-    </dgm:txFillClrLst>
-    <dgm:txEffectClrLst/>
-  </dgm:styleLbl>
-  <dgm:styleLbl name="alignImgPlace1">
-    <dgm:fillClrLst>
-      <a:schemeClr val="accent3">
-        <a:tint val="50000"/>
-      </a:schemeClr>
-      <a:schemeClr val="accent4">
-        <a:tint val="20000"/>
-      </a:schemeClr>
-    </dgm:fillClrLst>
-    <dgm:linClrLst meth="repeat">
-      <a:schemeClr val="lt1"/>
-    </dgm:linClrLst>
-    <dgm:effectClrLst/>
-    <dgm:txLinClrLst/>
-    <dgm:txFillClrLst meth="repeat">
-      <a:schemeClr val="lt1"/>
-    </dgm:txFillClrLst>
-    <dgm:txEffectClrLst/>
-  </dgm:styleLbl>
-  <dgm:styleLbl name="bgImgPlace1">
-    <dgm:fillClrLst>
-      <a:schemeClr val="accent3">
-        <a:tint val="50000"/>
-      </a:schemeClr>
-      <a:schemeClr val="accent4">
-        <a:tint val="20000"/>
-      </a:schemeClr>
-    </dgm:fillClrLst>
-    <dgm:linClrLst meth="repeat">
-      <a:schemeClr val="lt1"/>
-    </dgm:linClrLst>
-    <dgm:effectClrLst/>
-    <dgm:txLinClrLst/>
-    <dgm:txFillClrLst meth="repeat">
-      <a:schemeClr val="lt1"/>
-    </dgm:txFillClrLst>
-    <dgm:txEffectClrLst/>
-  </dgm:styleLbl>
-  <dgm:styleLbl name="sibTrans2D1">
-    <dgm:fillClrLst>
-      <a:schemeClr val="accent3"/>
-      <a:schemeClr val="accent4"/>
-    </dgm:fillClrLst>
-    <dgm:linClrLst meth="repeat">
-      <a:schemeClr val="lt1"/>
-    </dgm:linClrLst>
-    <dgm:effectClrLst/>
-    <dgm:txLinClrLst/>
-    <dgm:txFillClrLst/>
-    <dgm:txEffectClrLst/>
-  </dgm:styleLbl>
-  <dgm:styleLbl name="fgSibTrans2D1">
-    <dgm:fillClrLst>
-      <a:schemeClr val="accent3"/>
-      <a:schemeClr val="accent4"/>
-    </dgm:fillClrLst>
-    <dgm:linClrLst meth="repeat">
-      <a:schemeClr val="lt1"/>
-    </dgm:linClrLst>
-    <dgm:effectClrLst/>
-    <dgm:txLinClrLst/>
-    <dgm:txFillClrLst meth="repeat">
-      <a:schemeClr val="lt1"/>
-    </dgm:txFillClrLst>
-    <dgm:txEffectClrLst/>
-  </dgm:styleLbl>
-  <dgm:styleLbl name="bgSibTrans2D1">
-    <dgm:fillClrLst>
-      <a:schemeClr val="accent3"/>
-      <a:schemeClr val="accent4"/>
-    </dgm:fillClrLst>
-    <dgm:linClrLst meth="repeat">
-      <a:schemeClr val="lt1"/>
-    </dgm:linClrLst>
-    <dgm:effectClrLst/>
-    <dgm:txLinClrLst/>
-    <dgm:txFillClrLst meth="repeat">
-      <a:schemeClr val="lt1"/>
-    </dgm:txFillClrLst>
-    <dgm:txEffectClrLst/>
-  </dgm:styleLbl>
-  <dgm:styleLbl name="sibTrans1D1">
-    <dgm:fillClrLst/>
-    <dgm:linClrLst>
-      <a:schemeClr val="accent3"/>
-      <a:schemeClr val="accent4"/>
-    </dgm:linClrLst>
-    <dgm:effectClrLst/>
-    <dgm:txLinClrLst/>
-    <dgm:txFillClrLst meth="repeat">
-      <a:schemeClr val="tx1"/>
-    </dgm:txFillClrLst>
-    <dgm:txEffectClrLst/>
-  </dgm:styleLbl>
-  <dgm:styleLbl name="callout">
-    <dgm:fillClrLst meth="repeat">
-      <a:schemeClr val="accent3"/>
-    </dgm:fillClrLst>
-    <dgm:linClrLst meth="repeat">
-      <a:schemeClr val="accent3">
-        <a:tint val="50000"/>
-      </a:schemeClr>
-    </dgm:linClrLst>
-    <dgm:effectClrLst/>
-    <dgm:txLinClrLst/>
-    <dgm:txFillClrLst meth="repeat">
-      <a:schemeClr val="tx1"/>
-    </dgm:txFillClrLst>
-    <dgm:txEffectClrLst/>
-  </dgm:styleLbl>
-  <dgm:styleLbl name="asst0">
-    <dgm:fillClrLst meth="repeat">
-      <a:schemeClr val="accent3"/>
-    </dgm:fillClrLst>
-    <dgm:linClrLst meth="repeat">
-      <a:schemeClr val="lt1">
-        <a:shade val="80000"/>
-      </a:schemeClr>
-    </dgm:linClrLst>
-    <dgm:effectClrLst/>
-    <dgm:txLinClrLst/>
-    <dgm:txFillClrLst/>
-    <dgm:txEffectClrLst/>
-  </dgm:styleLbl>
-  <dgm:styleLbl name="asst1">
-    <dgm:fillClrLst meth="repeat">
-      <a:schemeClr val="accent4"/>
-    </dgm:fillClrLst>
-    <dgm:linClrLst meth="repeat">
-      <a:schemeClr val="lt1">
-        <a:shade val="80000"/>
-      </a:schemeClr>
-    </dgm:linClrLst>
-    <dgm:effectClrLst/>
-    <dgm:txLinClrLst/>
-    <dgm:txFillClrLst/>
-    <dgm:txEffectClrLst/>
-  </dgm:styleLbl>
-  <dgm:styleLbl name="asst2">
-    <dgm:fillClrLst>
-      <a:schemeClr val="accent5"/>
-    </dgm:fillClrLst>
-    <dgm:linClrLst meth="repeat">
-      <a:schemeClr val="lt1"/>
-    </dgm:linClrLst>
-    <dgm:effectClrLst/>
-    <dgm:txLinClrLst/>
-    <dgm:txFillClrLst/>
-    <dgm:txEffectClrLst/>
-  </dgm:styleLbl>
-  <dgm:styleLbl name="asst3">
-    <dgm:fillClrLst>
-      <a:schemeClr val="accent6"/>
-    </dgm:fillClrLst>
-    <dgm:linClrLst meth="repeat">
-      <a:schemeClr val="lt1"/>
-    </dgm:linClrLst>
-    <dgm:effectClrLst/>
-    <dgm:txLinClrLst/>
-    <dgm:txFillClrLst/>
-    <dgm:txEffectClrLst/>
-  </dgm:styleLbl>
-  <dgm:styleLbl name="asst4">
-    <dgm:fillClrLst>
-      <a:schemeClr val="accent1"/>
-    </dgm:fillClrLst>
-    <dgm:linClrLst meth="repeat">
-      <a:schemeClr val="lt1"/>
-    </dgm:linClrLst>
-    <dgm:effectClrLst/>
-    <dgm:txLinClrLst/>
-    <dgm:txFillClrLst/>
-    <dgm:txEffectClrLst/>
-  </dgm:styleLbl>
-  <dgm:styleLbl name="parChTrans2D1">
-    <dgm:fillClrLst meth="repeat">
-      <a:schemeClr val="accent2"/>
-    </dgm:fillClrLst>
-    <dgm:linClrLst meth="repeat">
-      <a:schemeClr val="lt1"/>
-    </dgm:linClrLst>
-    <dgm:effectClrLst/>
-    <dgm:txLinClrLst/>
-    <dgm:txFillClrLst meth="repeat">
-      <a:schemeClr val="lt1"/>
-    </dgm:txFillClrLst>
-    <dgm:txEffectClrLst/>
-  </dgm:styleLbl>
-  <dgm:styleLbl name="parChTrans2D2">
-    <dgm:fillClrLst meth="repeat">
-      <a:schemeClr val="accent3"/>
-    </dgm:fillClrLst>
-    <dgm:linClrLst meth="repeat">
-      <a:schemeClr val="lt1"/>
-    </dgm:linClrLst>
-    <dgm:effectClrLst/>
-    <dgm:txLinClrLst/>
-    <dgm:txFillClrLst/>
-    <dgm:txEffectClrLst/>
-  </dgm:styleLbl>
-  <dgm:styleLbl name="parChTrans2D3">
-    <dgm:fillClrLst meth="repeat">
-      <a:schemeClr val="accent4"/>
-    </dgm:fillClrLst>
-    <dgm:linClrLst meth="repeat">
-      <a:schemeClr val="lt1"/>
-    </dgm:linClrLst>
-    <dgm:effectClrLst/>
-    <dgm:txLinClrLst/>
-    <dgm:txFillClrLst/>
-    <dgm:txEffectClrLst/>
-  </dgm:styleLbl>
-  <dgm:styleLbl name="parChTrans2D4">
-    <dgm:fillClrLst meth="repeat">
-      <a:schemeClr val="accent5"/>
-    </dgm:fillClrLst>
-    <dgm:linClrLst meth="repeat">
-      <a:schemeClr val="lt1"/>
-    </dgm:linClrLst>
-    <dgm:effectClrLst/>
-    <dgm:txLinClrLst/>
-    <dgm:txFillClrLst meth="repeat">
-      <a:schemeClr val="lt1"/>
-    </dgm:txFillClrLst>
-    <dgm:txEffectClrLst/>
-  </dgm:styleLbl>
-  <dgm:styleLbl name="parChTrans1D1">
-    <dgm:fillClrLst meth="repeat">
-      <a:schemeClr val="accent3"/>
-    </dgm:fillClrLst>
-    <dgm:linClrLst meth="repeat">
-      <a:schemeClr val="accent3"/>
-    </dgm:linClrLst>
-    <dgm:effectClrLst/>
-    <dgm:txLinClrLst/>
-    <dgm:txFillClrLst meth="repeat">
-      <a:schemeClr val="tx1"/>
-    </dgm:txFillClrLst>
-    <dgm:txEffectClrLst/>
-  </dgm:styleLbl>
-  <dgm:styleLbl name="parChTrans1D2">
-    <dgm:fillClrLst meth="repeat">
-      <a:schemeClr val="accent2">
-        <a:tint val="90000"/>
-      </a:schemeClr>
-    </dgm:fillClrLst>
-    <dgm:linClrLst meth="repeat">
-      <a:schemeClr val="accent4"/>
-    </dgm:linClrLst>
-    <dgm:effectClrLst/>
-    <dgm:txLinClrLst/>
-    <dgm:txFillClrLst meth="repeat">
-      <a:schemeClr val="tx1"/>
-    </dgm:txFillClrLst>
-    <dgm:txEffectClrLst/>
-  </dgm:styleLbl>
-  <dgm:styleLbl name="parChTrans1D3">
-    <dgm:fillClrLst meth="repeat">
-      <a:schemeClr val="accent2">
-        <a:tint val="70000"/>
-      </a:schemeClr>
-    </dgm:fillClrLst>
-    <dgm:linClrLst meth="repeat">
-      <a:schemeClr val="accent5"/>
-    </dgm:linClrLst>
-    <dgm:effectClrLst/>
-    <dgm:txLinClrLst/>
-    <dgm:txFillClrLst meth="repeat">
-      <a:schemeClr val="tx1"/>
-    </dgm:txFillClrLst>
-    <dgm:txEffectClrLst/>
-  </dgm:styleLbl>
-  <dgm:styleLbl name="parChTrans1D4">
-    <dgm:fillClrLst meth="repeat">
-      <a:schemeClr val="accent6">
-        <a:tint val="50000"/>
-      </a:schemeClr>
-    </dgm:fillClrLst>
-    <dgm:linClrLst meth="repeat">
-      <a:schemeClr val="accent6"/>
-    </dgm:linClrLst>
-    <dgm:effectClrLst/>
-    <dgm:txLinClrLst/>
-    <dgm:txFillClrLst meth="repeat">
-      <a:schemeClr val="tx1"/>
-    </dgm:txFillClrLst>
-    <dgm:txEffectClrLst/>
-  </dgm:styleLbl>
-  <dgm:styleLbl name="fgAcc1">
-    <dgm:fillClrLst meth="repeat">
-      <a:schemeClr val="lt1">
-        <a:alpha val="90000"/>
-      </a:schemeClr>
-    </dgm:fillClrLst>
-    <dgm:linClrLst>
-      <a:schemeClr val="accent3"/>
-      <a:schemeClr val="accent4"/>
-    </dgm:linClrLst>
-    <dgm:effectClrLst/>
-    <dgm:txLinClrLst/>
-    <dgm:txFillClrLst meth="repeat">
-      <a:schemeClr val="dk1"/>
-    </dgm:txFillClrLst>
-    <dgm:txEffectClrLst/>
-  </dgm:styleLbl>
-  <dgm:styleLbl name="conFgAcc1">
-    <dgm:fillClrLst meth="repeat">
-      <a:schemeClr val="lt1">
-        <a:alpha val="90000"/>
-      </a:schemeClr>
-    </dgm:fillClrLst>
-    <dgm:linClrLst>
-      <a:schemeClr val="accent3"/>
-      <a:schemeClr val="accent4"/>
-    </dgm:linClrLst>
-    <dgm:effectClrLst/>
-    <dgm:txLinClrLst/>
-    <dgm:txFillClrLst meth="repeat">
-      <a:schemeClr val="dk1"/>
-    </dgm:txFillClrLst>
-    <dgm:txEffectClrLst/>
-  </dgm:styleLbl>
-  <dgm:styleLbl name="alignAcc1">
-    <dgm:fillClrLst meth="repeat">
-      <a:schemeClr val="lt1">
-        <a:alpha val="90000"/>
-      </a:schemeClr>
-    </dgm:fillClrLst>
-    <dgm:linClrLst>
-      <a:schemeClr val="accent3"/>
-      <a:schemeClr val="accent4"/>
-    </dgm:linClrLst>
-    <dgm:effectClrLst/>
-    <dgm:txLinClrLst/>
-    <dgm:txFillClrLst meth="repeat">
-      <a:schemeClr val="dk1"/>
-    </dgm:txFillClrLst>
-    <dgm:txEffectClrLst/>
-  </dgm:styleLbl>
-  <dgm:styleLbl name="trAlignAcc1">
-    <dgm:fillClrLst meth="repeat">
-      <a:schemeClr val="lt1">
-        <a:alpha val="40000"/>
-      </a:schemeClr>
-    </dgm:fillClrLst>
-    <dgm:linClrLst meth="repeat">
-      <a:schemeClr val="accent2"/>
-    </dgm:linClrLst>
-    <dgm:effectClrLst/>
-    <dgm:txLinClrLst/>
-    <dgm:txFillClrLst meth="repeat">
-      <a:schemeClr val="dk1"/>
-    </dgm:txFillClrLst>
-    <dgm:txEffectClrLst/>
-  </dgm:styleLbl>
-  <dgm:styleLbl name="bgAcc1">
-    <dgm:fillClrLst meth="repeat">
-      <a:schemeClr val="lt1">
-        <a:alpha val="90000"/>
-      </a:schemeClr>
-    </dgm:fillClrLst>
-    <dgm:linClrLst>
-      <a:schemeClr val="accent3"/>
-      <a:schemeClr val="accent4"/>
-    </dgm:linClrLst>
-    <dgm:effectClrLst/>
-    <dgm:txLinClrLst/>
-    <dgm:txFillClrLst meth="repeat">
-      <a:schemeClr val="dk1"/>
-    </dgm:txFillClrLst>
-    <dgm:txEffectClrLst/>
-  </dgm:styleLbl>
-  <dgm:styleLbl name="solidFgAcc1">
-    <dgm:fillClrLst meth="repeat">
-      <a:schemeClr val="lt1"/>
-    </dgm:fillClrLst>
-    <dgm:linClrLst>
-      <a:schemeClr val="accent3"/>
-      <a:schemeClr val="accent4"/>
-    </dgm:linClrLst>
-    <dgm:effectClrLst/>
-    <dgm:txLinClrLst/>
-    <dgm:txFillClrLst meth="repeat">
-      <a:schemeClr val="dk1"/>
-    </dgm:txFillClrLst>
-    <dgm:txEffectClrLst/>
-  </dgm:styleLbl>
-  <dgm:styleLbl name="solidAlignAcc1">
-    <dgm:fillClrLst meth="repeat">
-      <a:schemeClr val="lt1"/>
-    </dgm:fillClrLst>
-    <dgm:linClrLst>
-      <a:schemeClr val="accent3"/>
-      <a:schemeClr val="accent4"/>
-    </dgm:linClrLst>
-    <dgm:effectClrLst/>
-    <dgm:txLinClrLst/>
-    <dgm:txFillClrLst meth="repeat">
-      <a:schemeClr val="dk1"/>
-    </dgm:txFillClrLst>
-    <dgm:txEffectClrLst/>
-  </dgm:styleLbl>
-  <dgm:styleLbl name="solidBgAcc1">
-    <dgm:fillClrLst meth="repeat">
-      <a:schemeClr val="lt1"/>
-    </dgm:fillClrLst>
-    <dgm:linClrLst>
-      <a:schemeClr val="accent3"/>
-      <a:schemeClr val="accent4"/>
-    </dgm:linClrLst>
-    <dgm:effectClrLst/>
-    <dgm:txLinClrLst/>
-    <dgm:txFillClrLst meth="repeat">
-      <a:schemeClr val="dk1"/>
-    </dgm:txFillClrLst>
-    <dgm:txEffectClrLst/>
-  </dgm:styleLbl>
-  <dgm:styleLbl name="fgAccFollowNode1">
-    <dgm:fillClrLst>
-      <a:schemeClr val="accent3">
-        <a:tint val="40000"/>
-        <a:alpha val="90000"/>
-      </a:schemeClr>
-      <a:schemeClr val="accent4">
-        <a:tint val="40000"/>
-        <a:alpha val="90000"/>
-      </a:schemeClr>
-    </dgm:fillClrLst>
-    <dgm:linClrLst>
-      <a:schemeClr val="accent3">
-        <a:tint val="40000"/>
-        <a:alpha val="90000"/>
-      </a:schemeClr>
-      <a:schemeClr val="accent4">
-        <a:tint val="40000"/>
-        <a:alpha val="90000"/>
-      </a:schemeClr>
-    </dgm:linClrLst>
-    <dgm:effectClrLst/>
-    <dgm:txLinClrLst/>
-    <dgm:txFillClrLst meth="repeat">
-      <a:schemeClr val="dk1"/>
-    </dgm:txFillClrLst>
-    <dgm:txEffectClrLst/>
-  </dgm:styleLbl>
-  <dgm:styleLbl name="alignAccFollowNode1">
-    <dgm:fillClrLst>
-      <a:schemeClr val="accent3">
-        <a:tint val="40000"/>
-        <a:alpha val="90000"/>
-      </a:schemeClr>
-      <a:schemeClr val="accent4">
-        <a:tint val="40000"/>
-        <a:alpha val="90000"/>
-      </a:schemeClr>
-    </dgm:fillClrLst>
-    <dgm:linClrLst>
-      <a:schemeClr val="accent3">
-        <a:tint val="40000"/>
-        <a:alpha val="90000"/>
-      </a:schemeClr>
-      <a:schemeClr val="accent4">
-        <a:tint val="40000"/>
-        <a:alpha val="90000"/>
-      </a:schemeClr>
-    </dgm:linClrLst>
-    <dgm:effectClrLst/>
-    <dgm:txLinClrLst/>
-    <dgm:txFillClrLst meth="repeat">
-      <a:schemeClr val="dk1"/>
-    </dgm:txFillClrLst>
-    <dgm:txEffectClrLst/>
-  </dgm:styleLbl>
-  <dgm:styleLbl name="bgAccFollowNode1">
-    <dgm:fillClrLst>
-      <a:schemeClr val="accent3">
-        <a:tint val="40000"/>
-        <a:alpha val="90000"/>
-      </a:schemeClr>
-      <a:schemeClr val="accent4">
-        <a:tint val="40000"/>
-        <a:alpha val="90000"/>
-      </a:schemeClr>
-    </dgm:fillClrLst>
-    <dgm:linClrLst>
-      <a:schemeClr val="accent3">
-        <a:tint val="40000"/>
-        <a:alpha val="90000"/>
-      </a:schemeClr>
-      <a:schemeClr val="accent4">
-        <a:tint val="40000"/>
-        <a:alpha val="90000"/>
-      </a:schemeClr>
-    </dgm:linClrLst>
-    <dgm:effectClrLst/>
-    <dgm:txLinClrLst/>
-    <dgm:txFillClrLst meth="repeat">
-      <a:schemeClr val="dk1"/>
-    </dgm:txFillClrLst>
-    <dgm:txEffectClrLst/>
-  </dgm:styleLbl>
-  <dgm:styleLbl name="fgAcc0">
-    <dgm:fillClrLst meth="repeat">
-      <a:schemeClr val="lt1">
-        <a:alpha val="90000"/>
-      </a:schemeClr>
-    </dgm:fillClrLst>
-    <dgm:linClrLst>
-      <a:schemeClr val="accent2"/>
-    </dgm:linClrLst>
-    <dgm:effectClrLst/>
-    <dgm:txLinClrLst/>
-    <dgm:txFillClrLst meth="repeat">
-      <a:schemeClr val="dk1"/>
-    </dgm:txFillClrLst>
-    <dgm:txEffectClrLst/>
-  </dgm:styleLbl>
-  <dgm:styleLbl name="fgAcc2">
-    <dgm:fillClrLst meth="repeat">
-      <a:schemeClr val="lt1">
-        <a:alpha val="90000"/>
-      </a:schemeClr>
-    </dgm:fillClrLst>
-    <dgm:linClrLst>
-      <a:schemeClr val="accent4"/>
-    </dgm:linClrLst>
-    <dgm:effectClrLst/>
-    <dgm:txLinClrLst/>
-    <dgm:txFillClrLst meth="repeat">
-      <a:schemeClr val="dk1"/>
-    </dgm:txFillClrLst>
-    <dgm:txEffectClrLst/>
-  </dgm:styleLbl>
-  <dgm:styleLbl name="fgAcc3">
-    <dgm:fillClrLst meth="repeat">
-      <a:schemeClr val="lt1">
-        <a:alpha val="90000"/>
-      </a:schemeClr>
-    </dgm:fillClrLst>
-    <dgm:linClrLst>
-      <a:schemeClr val="accent5"/>
-    </dgm:linClrLst>
-    <dgm:effectClrLst/>
-    <dgm:txLinClrLst/>
-    <dgm:txFillClrLst meth="repeat">
-      <a:schemeClr val="dk1"/>
-    </dgm:txFillClrLst>
-    <dgm:txEffectClrLst/>
-  </dgm:styleLbl>
-  <dgm:styleLbl name="fgAcc4">
-    <dgm:fillClrLst meth="repeat">
-      <a:schemeClr val="lt1">
-        <a:alpha val="90000"/>
-      </a:schemeClr>
-    </dgm:fillClrLst>
-    <dgm:linClrLst>
-      <a:schemeClr val="accent6"/>
-    </dgm:linClrLst>
-    <dgm:effectClrLst/>
-    <dgm:txLinClrLst/>
-    <dgm:txFillClrLst meth="repeat">
-      <a:schemeClr val="dk1"/>
-    </dgm:txFillClrLst>
-    <dgm:txEffectClrLst/>
-  </dgm:styleLbl>
-  <dgm:styleLbl name="bgShp">
-    <dgm:fillClrLst meth="repeat">
-      <a:schemeClr val="accent3">
-        <a:tint val="40000"/>
-      </a:schemeClr>
-    </dgm:fillClrLst>
-    <dgm:linClrLst meth="repeat">
-      <a:schemeClr val="dk1"/>
-    </dgm:linClrLst>
-    <dgm:effectClrLst/>
-    <dgm:txLinClrLst/>
-    <dgm:txFillClrLst meth="repeat">
-      <a:schemeClr val="dk1"/>
-    </dgm:txFillClrLst>
-    <dgm:txEffectClrLst/>
-  </dgm:styleLbl>
-  <dgm:styleLbl name="dkBgShp">
-    <dgm:fillClrLst meth="repeat">
-      <a:schemeClr val="accent3">
-        <a:shade val="90000"/>
-      </a:schemeClr>
-    </dgm:fillClrLst>
-    <dgm:linClrLst meth="repeat">
-      <a:schemeClr val="dk1"/>
-    </dgm:linClrLst>
-    <dgm:effectClrLst/>
-    <dgm:txLinClrLst/>
-    <dgm:txFillClrLst meth="repeat">
-      <a:schemeClr val="lt1"/>
-    </dgm:txFillClrLst>
-    <dgm:txEffectClrLst/>
-  </dgm:styleLbl>
-  <dgm:styleLbl name="trBgShp">
-    <dgm:fillClrLst meth="repeat">
-      <a:schemeClr val="accent2">
-        <a:tint val="50000"/>
-        <a:alpha val="40000"/>
-      </a:schemeClr>
-    </dgm:fillClrLst>
-    <dgm:linClrLst meth="repeat">
-      <a:schemeClr val="accent3"/>
-    </dgm:linClrLst>
-    <dgm:effectClrLst/>
-    <dgm:txLinClrLst/>
-    <dgm:txFillClrLst meth="repeat">
-      <a:schemeClr val="lt1"/>
-    </dgm:txFillClrLst>
-    <dgm:txEffectClrLst/>
-  </dgm:styleLbl>
-  <dgm:styleLbl name="fgShp">
-    <dgm:fillClrLst meth="repeat">
-      <a:schemeClr val="accent3">
-        <a:tint val="40000"/>
-      </a:schemeClr>
-    </dgm:fillClrLst>
-    <dgm:linClrLst meth="repeat">
-      <a:schemeClr val="lt1"/>
-    </dgm:linClrLst>
-    <dgm:effectClrLst/>
-    <dgm:txLinClrLst/>
-    <dgm:txFillClrLst meth="repeat">
-      <a:schemeClr val="dk1"/>
-    </dgm:txFillClrLst>
-    <dgm:txEffectClrLst/>
-  </dgm:styleLbl>
-  <dgm:styleLbl name="revTx">
-    <dgm:fillClrLst meth="repeat">
-      <a:schemeClr val="lt1">
-        <a:alpha val="0"/>
-      </a:schemeClr>
-    </dgm:fillClrLst>
-    <dgm:linClrLst meth="repeat">
-      <a:schemeClr val="dk1">
-        <a:alpha val="0"/>
-      </a:schemeClr>
-    </dgm:linClrLst>
-    <dgm:effectClrLst/>
-    <dgm:txLinClrLst/>
-    <dgm:txFillClrLst meth="repeat">
-      <a:schemeClr val="tx1"/>
-    </dgm:txFillClrLst>
-    <dgm:txEffectClrLst/>
-  </dgm:styleLbl>
-</dgm:colorsDef>
-</file>
-
-<file path=ppt/diagrams/colors2.xml><?xml version="1.0" encoding="utf-8"?>
 <dgm:colorsDef xmlns:dgm="http://schemas.openxmlformats.org/drawingml/2006/diagram" xmlns:a="http://schemas.openxmlformats.org/drawingml/2006/main" uniqueId="urn:microsoft.com/office/officeart/2005/8/colors/colorful3">
   <dgm:title val=""/>
   <dgm:desc val=""/>
@@ -2051,243 +1269,6 @@
   <dgm:extLst>
     <a:ext uri="http://schemas.microsoft.com/office/drawing/2008/diagram">
       <dsp:dataModelExt xmlns:dsp="http://schemas.microsoft.com/office/drawing/2008/diagram" relId="rId6" minVer="http://schemas.openxmlformats.org/drawingml/2006/diagram"/>
-    </a:ext>
-  </dgm:extLst>
-</dgm:dataModel>
-</file>
-
-<file path=ppt/diagrams/data2.xml><?xml version="1.0" encoding="utf-8"?>
-<dgm:dataModel xmlns:dgm="http://schemas.openxmlformats.org/drawingml/2006/diagram" xmlns:a="http://schemas.openxmlformats.org/drawingml/2006/main">
-  <dgm:ptLst>
-    <dgm:pt modelId="{B22A3665-0965-48D7-B442-9E280445EAB2}" type="doc">
-      <dgm:prSet loTypeId="urn:microsoft.com/office/officeart/2008/layout/AlternatingHexagons" loCatId="list" qsTypeId="urn:microsoft.com/office/officeart/2005/8/quickstyle/simple1" qsCatId="simple" csTypeId="urn:microsoft.com/office/officeart/2005/8/colors/colorful3" csCatId="colorful" phldr="1"/>
-      <dgm:spPr/>
-      <dgm:t>
-        <a:bodyPr/>
-        <a:lstStyle/>
-        <a:p>
-          <a:endParaRPr lang="fr-FR"/>
-        </a:p>
-      </dgm:t>
-    </dgm:pt>
-    <dgm:pt modelId="{E8971C13-703C-4476-91E3-2818A70FE036}">
-      <dgm:prSet phldrT="[Texte]"/>
-      <dgm:spPr/>
-      <dgm:t>
-        <a:bodyPr/>
-        <a:lstStyle/>
-        <a:p>
-          <a:r>
-            <a:rPr lang="fr-FR" dirty="0" smtClean="0"/>
-            <a:t>PDF</a:t>
-          </a:r>
-          <a:endParaRPr lang="fr-FR" dirty="0"/>
-        </a:p>
-      </dgm:t>
-    </dgm:pt>
-    <dgm:pt modelId="{13C1B642-CDCD-4746-9111-46C2807B3835}" type="parTrans" cxnId="{1E27ACA7-9801-4C2A-97C1-AAB3D165451A}">
-      <dgm:prSet/>
-      <dgm:spPr/>
-      <dgm:t>
-        <a:bodyPr/>
-        <a:lstStyle/>
-        <a:p>
-          <a:endParaRPr lang="fr-FR"/>
-        </a:p>
-      </dgm:t>
-    </dgm:pt>
-    <dgm:pt modelId="{063D21D9-8CA2-49AD-91D3-DAA79F240084}" type="sibTrans" cxnId="{1E27ACA7-9801-4C2A-97C1-AAB3D165451A}">
-      <dgm:prSet/>
-      <dgm:spPr/>
-      <dgm:t>
-        <a:bodyPr/>
-        <a:lstStyle/>
-        <a:p>
-          <a:r>
-            <a:rPr lang="fr-FR" dirty="0" err="1" smtClean="0"/>
-            <a:t>Users</a:t>
-          </a:r>
-          <a:endParaRPr lang="fr-FR" dirty="0"/>
-        </a:p>
-      </dgm:t>
-    </dgm:pt>
-    <dgm:pt modelId="{8380CDAA-B53D-4B62-A737-5011525D20B7}">
-      <dgm:prSet/>
-      <dgm:spPr/>
-      <dgm:t>
-        <a:bodyPr/>
-        <a:lstStyle/>
-        <a:p>
-          <a:r>
-            <a:rPr lang="fr-FR" dirty="0" smtClean="0"/>
-            <a:t>Comptabilité</a:t>
-          </a:r>
-          <a:endParaRPr lang="fr-FR" dirty="0"/>
-        </a:p>
-      </dgm:t>
-    </dgm:pt>
-    <dgm:pt modelId="{C563F5A7-2648-4957-85B1-24C5FB98CF9E}" type="sibTrans" cxnId="{92B46B56-DEBF-4940-BCA0-D2F992512099}">
-      <dgm:prSet/>
-      <dgm:spPr/>
-      <dgm:t>
-        <a:bodyPr/>
-        <a:lstStyle/>
-        <a:p>
-          <a:r>
-            <a:rPr lang="fr-FR" dirty="0" smtClean="0"/>
-            <a:t>REST</a:t>
-          </a:r>
-          <a:endParaRPr lang="fr-FR" dirty="0"/>
-        </a:p>
-      </dgm:t>
-    </dgm:pt>
-    <dgm:pt modelId="{0A417024-26BF-4235-84D7-D807758F2856}" type="parTrans" cxnId="{92B46B56-DEBF-4940-BCA0-D2F992512099}">
-      <dgm:prSet/>
-      <dgm:spPr/>
-      <dgm:t>
-        <a:bodyPr/>
-        <a:lstStyle/>
-        <a:p>
-          <a:endParaRPr lang="fr-FR"/>
-        </a:p>
-      </dgm:t>
-    </dgm:pt>
-    <dgm:pt modelId="{8D643E02-C76E-476C-864E-B74F35EA421A}" type="pres">
-      <dgm:prSet presAssocID="{B22A3665-0965-48D7-B442-9E280445EAB2}" presName="Name0" presStyleCnt="0">
-        <dgm:presLayoutVars>
-          <dgm:chMax/>
-          <dgm:chPref/>
-          <dgm:dir/>
-          <dgm:animLvl val="lvl"/>
-        </dgm:presLayoutVars>
-      </dgm:prSet>
-      <dgm:spPr/>
-    </dgm:pt>
-    <dgm:pt modelId="{E8ABB4B8-7295-4E15-BE55-0C3B71BD66F7}" type="pres">
-      <dgm:prSet presAssocID="{E8971C13-703C-4476-91E3-2818A70FE036}" presName="composite" presStyleCnt="0"/>
-      <dgm:spPr/>
-    </dgm:pt>
-    <dgm:pt modelId="{20CB1645-5023-4E74-B095-B8FA1D81B1D0}" type="pres">
-      <dgm:prSet presAssocID="{E8971C13-703C-4476-91E3-2818A70FE036}" presName="Parent1" presStyleLbl="node1" presStyleIdx="0" presStyleCnt="4">
-        <dgm:presLayoutVars>
-          <dgm:chMax val="1"/>
-          <dgm:chPref val="1"/>
-          <dgm:bulletEnabled val="1"/>
-        </dgm:presLayoutVars>
-      </dgm:prSet>
-      <dgm:spPr/>
-    </dgm:pt>
-    <dgm:pt modelId="{247EB136-01E5-4E91-A406-72A42E93DC32}" type="pres">
-      <dgm:prSet presAssocID="{E8971C13-703C-4476-91E3-2818A70FE036}" presName="Childtext1" presStyleLbl="revTx" presStyleIdx="0" presStyleCnt="2">
-        <dgm:presLayoutVars>
-          <dgm:chMax val="0"/>
-          <dgm:chPref val="0"/>
-          <dgm:bulletEnabled val="1"/>
-        </dgm:presLayoutVars>
-      </dgm:prSet>
-      <dgm:spPr/>
-      <dgm:t>
-        <a:bodyPr/>
-        <a:lstStyle/>
-        <a:p>
-          <a:endParaRPr lang="fr-FR"/>
-        </a:p>
-      </dgm:t>
-    </dgm:pt>
-    <dgm:pt modelId="{6ADCF208-DC60-4156-9ED6-F7DC0FFDE73A}" type="pres">
-      <dgm:prSet presAssocID="{E8971C13-703C-4476-91E3-2818A70FE036}" presName="BalanceSpacing" presStyleCnt="0"/>
-      <dgm:spPr/>
-    </dgm:pt>
-    <dgm:pt modelId="{4515974F-696D-4F02-9C79-BC27049A20FB}" type="pres">
-      <dgm:prSet presAssocID="{E8971C13-703C-4476-91E3-2818A70FE036}" presName="BalanceSpacing1" presStyleCnt="0"/>
-      <dgm:spPr/>
-    </dgm:pt>
-    <dgm:pt modelId="{106EE1FC-9A22-4632-B0C0-991717F8E577}" type="pres">
-      <dgm:prSet presAssocID="{063D21D9-8CA2-49AD-91D3-DAA79F240084}" presName="Accent1Text" presStyleLbl="node1" presStyleIdx="1" presStyleCnt="4"/>
-      <dgm:spPr/>
-      <dgm:t>
-        <a:bodyPr/>
-        <a:lstStyle/>
-        <a:p>
-          <a:endParaRPr lang="fr-FR"/>
-        </a:p>
-      </dgm:t>
-    </dgm:pt>
-    <dgm:pt modelId="{5CF67120-F6BD-46BB-BC1F-F05D6B6DAFB6}" type="pres">
-      <dgm:prSet presAssocID="{063D21D9-8CA2-49AD-91D3-DAA79F240084}" presName="spaceBetweenRectangles" presStyleCnt="0"/>
-      <dgm:spPr/>
-    </dgm:pt>
-    <dgm:pt modelId="{BDF38499-CBEB-4A47-8815-CB5D9DCE1BBF}" type="pres">
-      <dgm:prSet presAssocID="{8380CDAA-B53D-4B62-A737-5011525D20B7}" presName="composite" presStyleCnt="0"/>
-      <dgm:spPr/>
-    </dgm:pt>
-    <dgm:pt modelId="{84D1921D-18E9-419A-B061-57FBC019CAF1}" type="pres">
-      <dgm:prSet presAssocID="{8380CDAA-B53D-4B62-A737-5011525D20B7}" presName="Parent1" presStyleLbl="node1" presStyleIdx="2" presStyleCnt="4">
-        <dgm:presLayoutVars>
-          <dgm:chMax val="1"/>
-          <dgm:chPref val="1"/>
-          <dgm:bulletEnabled val="1"/>
-        </dgm:presLayoutVars>
-      </dgm:prSet>
-      <dgm:spPr/>
-      <dgm:t>
-        <a:bodyPr/>
-        <a:lstStyle/>
-        <a:p>
-          <a:endParaRPr lang="fr-FR"/>
-        </a:p>
-      </dgm:t>
-    </dgm:pt>
-    <dgm:pt modelId="{731019A7-D36B-4797-AC81-A728523341B7}" type="pres">
-      <dgm:prSet presAssocID="{8380CDAA-B53D-4B62-A737-5011525D20B7}" presName="Childtext1" presStyleLbl="revTx" presStyleIdx="1" presStyleCnt="2">
-        <dgm:presLayoutVars>
-          <dgm:chMax val="0"/>
-          <dgm:chPref val="0"/>
-          <dgm:bulletEnabled val="1"/>
-        </dgm:presLayoutVars>
-      </dgm:prSet>
-      <dgm:spPr/>
-    </dgm:pt>
-    <dgm:pt modelId="{E0352B6E-E8EB-4401-9ED6-C09163388DD5}" type="pres">
-      <dgm:prSet presAssocID="{8380CDAA-B53D-4B62-A737-5011525D20B7}" presName="BalanceSpacing" presStyleCnt="0"/>
-      <dgm:spPr/>
-    </dgm:pt>
-    <dgm:pt modelId="{14AA728D-DD0B-42A0-8E0D-AD3EC9005B91}" type="pres">
-      <dgm:prSet presAssocID="{8380CDAA-B53D-4B62-A737-5011525D20B7}" presName="BalanceSpacing1" presStyleCnt="0"/>
-      <dgm:spPr/>
-    </dgm:pt>
-    <dgm:pt modelId="{3B1D33B9-0603-40AB-8084-FCB436366988}" type="pres">
-      <dgm:prSet presAssocID="{C563F5A7-2648-4957-85B1-24C5FB98CF9E}" presName="Accent1Text" presStyleLbl="node1" presStyleIdx="3" presStyleCnt="4"/>
-      <dgm:spPr/>
-    </dgm:pt>
-  </dgm:ptLst>
-  <dgm:cxnLst>
-    <dgm:cxn modelId="{99297B0B-B16D-4801-ACCE-F0A21841B2BD}" type="presOf" srcId="{E8971C13-703C-4476-91E3-2818A70FE036}" destId="{20CB1645-5023-4E74-B095-B8FA1D81B1D0}" srcOrd="0" destOrd="0" presId="urn:microsoft.com/office/officeart/2008/layout/AlternatingHexagons"/>
-    <dgm:cxn modelId="{CFB88E60-7FB9-4943-91BE-CFF7AAF47EC2}" type="presOf" srcId="{8380CDAA-B53D-4B62-A737-5011525D20B7}" destId="{84D1921D-18E9-419A-B061-57FBC019CAF1}" srcOrd="0" destOrd="0" presId="urn:microsoft.com/office/officeart/2008/layout/AlternatingHexagons"/>
-    <dgm:cxn modelId="{237386D0-748F-4500-B063-BDEF2336B89A}" type="presOf" srcId="{C563F5A7-2648-4957-85B1-24C5FB98CF9E}" destId="{3B1D33B9-0603-40AB-8084-FCB436366988}" srcOrd="0" destOrd="0" presId="urn:microsoft.com/office/officeart/2008/layout/AlternatingHexagons"/>
-    <dgm:cxn modelId="{92B46B56-DEBF-4940-BCA0-D2F992512099}" srcId="{B22A3665-0965-48D7-B442-9E280445EAB2}" destId="{8380CDAA-B53D-4B62-A737-5011525D20B7}" srcOrd="1" destOrd="0" parTransId="{0A417024-26BF-4235-84D7-D807758F2856}" sibTransId="{C563F5A7-2648-4957-85B1-24C5FB98CF9E}"/>
-    <dgm:cxn modelId="{1E27ACA7-9801-4C2A-97C1-AAB3D165451A}" srcId="{B22A3665-0965-48D7-B442-9E280445EAB2}" destId="{E8971C13-703C-4476-91E3-2818A70FE036}" srcOrd="0" destOrd="0" parTransId="{13C1B642-CDCD-4746-9111-46C2807B3835}" sibTransId="{063D21D9-8CA2-49AD-91D3-DAA79F240084}"/>
-    <dgm:cxn modelId="{6B4F9E19-F194-4DCC-A74A-974F5A7E0EAE}" type="presOf" srcId="{063D21D9-8CA2-49AD-91D3-DAA79F240084}" destId="{106EE1FC-9A22-4632-B0C0-991717F8E577}" srcOrd="0" destOrd="0" presId="urn:microsoft.com/office/officeart/2008/layout/AlternatingHexagons"/>
-    <dgm:cxn modelId="{C857660E-CA5A-4E9E-8BE6-60DB73DCE7F4}" type="presOf" srcId="{B22A3665-0965-48D7-B442-9E280445EAB2}" destId="{8D643E02-C76E-476C-864E-B74F35EA421A}" srcOrd="0" destOrd="0" presId="urn:microsoft.com/office/officeart/2008/layout/AlternatingHexagons"/>
-    <dgm:cxn modelId="{47E64442-6487-40BB-BA45-E09312FEBD19}" type="presParOf" srcId="{8D643E02-C76E-476C-864E-B74F35EA421A}" destId="{E8ABB4B8-7295-4E15-BE55-0C3B71BD66F7}" srcOrd="0" destOrd="0" presId="urn:microsoft.com/office/officeart/2008/layout/AlternatingHexagons"/>
-    <dgm:cxn modelId="{AEE08BA8-D1FD-4495-9FFC-7283C1773AD2}" type="presParOf" srcId="{E8ABB4B8-7295-4E15-BE55-0C3B71BD66F7}" destId="{20CB1645-5023-4E74-B095-B8FA1D81B1D0}" srcOrd="0" destOrd="0" presId="urn:microsoft.com/office/officeart/2008/layout/AlternatingHexagons"/>
-    <dgm:cxn modelId="{A9D03EA8-F812-4A34-9E18-5F6B9725BB06}" type="presParOf" srcId="{E8ABB4B8-7295-4E15-BE55-0C3B71BD66F7}" destId="{247EB136-01E5-4E91-A406-72A42E93DC32}" srcOrd="1" destOrd="0" presId="urn:microsoft.com/office/officeart/2008/layout/AlternatingHexagons"/>
-    <dgm:cxn modelId="{CCA1742B-4B7D-47CA-99F2-7BABF0083C76}" type="presParOf" srcId="{E8ABB4B8-7295-4E15-BE55-0C3B71BD66F7}" destId="{6ADCF208-DC60-4156-9ED6-F7DC0FFDE73A}" srcOrd="2" destOrd="0" presId="urn:microsoft.com/office/officeart/2008/layout/AlternatingHexagons"/>
-    <dgm:cxn modelId="{3250E21A-EFA1-41CB-95A3-829528C226DA}" type="presParOf" srcId="{E8ABB4B8-7295-4E15-BE55-0C3B71BD66F7}" destId="{4515974F-696D-4F02-9C79-BC27049A20FB}" srcOrd="3" destOrd="0" presId="urn:microsoft.com/office/officeart/2008/layout/AlternatingHexagons"/>
-    <dgm:cxn modelId="{ABFC13D0-945F-41B1-B84B-93FB595D1427}" type="presParOf" srcId="{E8ABB4B8-7295-4E15-BE55-0C3B71BD66F7}" destId="{106EE1FC-9A22-4632-B0C0-991717F8E577}" srcOrd="4" destOrd="0" presId="urn:microsoft.com/office/officeart/2008/layout/AlternatingHexagons"/>
-    <dgm:cxn modelId="{D97DEC13-7611-4F92-868A-EE03988DE31C}" type="presParOf" srcId="{8D643E02-C76E-476C-864E-B74F35EA421A}" destId="{5CF67120-F6BD-46BB-BC1F-F05D6B6DAFB6}" srcOrd="1" destOrd="0" presId="urn:microsoft.com/office/officeart/2008/layout/AlternatingHexagons"/>
-    <dgm:cxn modelId="{6FBDFE0A-FE8D-46E1-9B28-7EC4BD2EA1E6}" type="presParOf" srcId="{8D643E02-C76E-476C-864E-B74F35EA421A}" destId="{BDF38499-CBEB-4A47-8815-CB5D9DCE1BBF}" srcOrd="2" destOrd="0" presId="urn:microsoft.com/office/officeart/2008/layout/AlternatingHexagons"/>
-    <dgm:cxn modelId="{366D9906-545C-4EED-A49F-92BE51859A98}" type="presParOf" srcId="{BDF38499-CBEB-4A47-8815-CB5D9DCE1BBF}" destId="{84D1921D-18E9-419A-B061-57FBC019CAF1}" srcOrd="0" destOrd="0" presId="urn:microsoft.com/office/officeart/2008/layout/AlternatingHexagons"/>
-    <dgm:cxn modelId="{06E46706-0B14-4EA8-B93A-2BC693BEDEF5}" type="presParOf" srcId="{BDF38499-CBEB-4A47-8815-CB5D9DCE1BBF}" destId="{731019A7-D36B-4797-AC81-A728523341B7}" srcOrd="1" destOrd="0" presId="urn:microsoft.com/office/officeart/2008/layout/AlternatingHexagons"/>
-    <dgm:cxn modelId="{13CB80C7-05B5-430A-B6BD-F93E19649F8D}" type="presParOf" srcId="{BDF38499-CBEB-4A47-8815-CB5D9DCE1BBF}" destId="{E0352B6E-E8EB-4401-9ED6-C09163388DD5}" srcOrd="2" destOrd="0" presId="urn:microsoft.com/office/officeart/2008/layout/AlternatingHexagons"/>
-    <dgm:cxn modelId="{2128CB3D-2771-4633-A51C-0C83E5D28A4D}" type="presParOf" srcId="{BDF38499-CBEB-4A47-8815-CB5D9DCE1BBF}" destId="{14AA728D-DD0B-42A0-8E0D-AD3EC9005B91}" srcOrd="3" destOrd="0" presId="urn:microsoft.com/office/officeart/2008/layout/AlternatingHexagons"/>
-    <dgm:cxn modelId="{3E72AF33-2541-4848-955C-9F7AD52D60B7}" type="presParOf" srcId="{BDF38499-CBEB-4A47-8815-CB5D9DCE1BBF}" destId="{3B1D33B9-0603-40AB-8084-FCB436366988}" srcOrd="4" destOrd="0" presId="urn:microsoft.com/office/officeart/2008/layout/AlternatingHexagons"/>
-  </dgm:cxnLst>
-  <dgm:bg/>
-  <dgm:whole/>
-  <dgm:extLst>
-    <a:ext uri="http://schemas.microsoft.com/office/drawing/2008/diagram">
-      <dsp:dataModelExt xmlns:dsp="http://schemas.microsoft.com/office/drawing/2008/diagram" relId="rId11" minVer="http://schemas.openxmlformats.org/drawingml/2006/diagram"/>
     </a:ext>
   </dgm:extLst>
 </dgm:dataModel>
@@ -2887,762 +1868,7 @@
 </dsp:drawing>
 </file>
 
-<file path=ppt/diagrams/drawing2.xml><?xml version="1.0" encoding="utf-8"?>
-<dsp:drawing xmlns:dgm="http://schemas.openxmlformats.org/drawingml/2006/diagram" xmlns:dsp="http://schemas.microsoft.com/office/drawing/2008/diagram" xmlns:a="http://schemas.openxmlformats.org/drawingml/2006/main">
-  <dsp:spTree>
-    <dsp:nvGrpSpPr>
-      <dsp:cNvPr id="0" name=""/>
-      <dsp:cNvGrpSpPr/>
-    </dsp:nvGrpSpPr>
-    <dsp:grpSpPr/>
-    <dsp:sp modelId="{20CB1645-5023-4E74-B095-B8FA1D81B1D0}">
-      <dsp:nvSpPr>
-        <dsp:cNvPr id="0" name=""/>
-        <dsp:cNvSpPr/>
-      </dsp:nvSpPr>
-      <dsp:spPr>
-        <a:xfrm rot="5400000">
-          <a:off x="3159372" y="706739"/>
-          <a:ext cx="2074985" cy="1805236"/>
-        </a:xfrm>
-        <a:prstGeom prst="hexagon">
-          <a:avLst>
-            <a:gd name="adj" fmla="val 25000"/>
-            <a:gd name="vf" fmla="val 115470"/>
-          </a:avLst>
-        </a:prstGeom>
-        <a:solidFill>
-          <a:schemeClr val="accent3">
-            <a:hueOff val="0"/>
-            <a:satOff val="0"/>
-            <a:lumOff val="0"/>
-            <a:alphaOff val="0"/>
-          </a:schemeClr>
-        </a:solidFill>
-        <a:ln w="12700" cap="flat" cmpd="sng" algn="ctr">
-          <a:solidFill>
-            <a:schemeClr val="lt1">
-              <a:hueOff val="0"/>
-              <a:satOff val="0"/>
-              <a:lumOff val="0"/>
-              <a:alphaOff val="0"/>
-            </a:schemeClr>
-          </a:solidFill>
-          <a:prstDash val="solid"/>
-          <a:miter lim="800000"/>
-        </a:ln>
-        <a:effectLst/>
-      </dsp:spPr>
-      <dsp:style>
-        <a:lnRef idx="2">
-          <a:scrgbClr r="0" g="0" b="0"/>
-        </a:lnRef>
-        <a:fillRef idx="1">
-          <a:scrgbClr r="0" g="0" b="0"/>
-        </a:fillRef>
-        <a:effectRef idx="0">
-          <a:scrgbClr r="0" g="0" b="0"/>
-        </a:effectRef>
-        <a:fontRef idx="minor">
-          <a:schemeClr val="lt1"/>
-        </a:fontRef>
-      </dsp:style>
-      <dsp:txBody>
-        <a:bodyPr spcFirstLastPara="0" vert="horz" wrap="square" lIns="60960" tIns="60960" rIns="60960" bIns="60960" numCol="1" spcCol="1270" anchor="ctr" anchorCtr="0">
-          <a:noAutofit/>
-        </a:bodyPr>
-        <a:lstStyle/>
-        <a:p>
-          <a:pPr lvl="0" algn="ctr" defTabSz="711200">
-            <a:lnSpc>
-              <a:spcPct val="90000"/>
-            </a:lnSpc>
-            <a:spcBef>
-              <a:spcPct val="0"/>
-            </a:spcBef>
-            <a:spcAft>
-              <a:spcPct val="35000"/>
-            </a:spcAft>
-          </a:pPr>
-          <a:r>
-            <a:rPr lang="fr-FR" sz="1600" kern="1200" dirty="0" smtClean="0"/>
-            <a:t>PDF</a:t>
-          </a:r>
-          <a:endParaRPr lang="fr-FR" sz="1600" kern="1200" dirty="0"/>
-        </a:p>
-      </dsp:txBody>
-      <dsp:txXfrm rot="-5400000">
-        <a:off x="3575562" y="895217"/>
-        <a:ext cx="1242604" cy="1428281"/>
-      </dsp:txXfrm>
-    </dsp:sp>
-    <dsp:sp modelId="{247EB136-01E5-4E91-A406-72A42E93DC32}">
-      <dsp:nvSpPr>
-        <dsp:cNvPr id="0" name=""/>
-        <dsp:cNvSpPr/>
-      </dsp:nvSpPr>
-      <dsp:spPr>
-        <a:xfrm>
-          <a:off x="5154262" y="986862"/>
-          <a:ext cx="2315683" cy="1244991"/>
-        </a:xfrm>
-        <a:prstGeom prst="rect">
-          <a:avLst/>
-        </a:prstGeom>
-        <a:noFill/>
-        <a:ln>
-          <a:noFill/>
-        </a:ln>
-        <a:effectLst/>
-      </dsp:spPr>
-      <dsp:style>
-        <a:lnRef idx="0">
-          <a:scrgbClr r="0" g="0" b="0"/>
-        </a:lnRef>
-        <a:fillRef idx="0">
-          <a:scrgbClr r="0" g="0" b="0"/>
-        </a:fillRef>
-        <a:effectRef idx="0">
-          <a:scrgbClr r="0" g="0" b="0"/>
-        </a:effectRef>
-        <a:fontRef idx="minor"/>
-      </dsp:style>
-    </dsp:sp>
-    <dsp:sp modelId="{106EE1FC-9A22-4632-B0C0-991717F8E577}">
-      <dsp:nvSpPr>
-        <dsp:cNvPr id="0" name=""/>
-        <dsp:cNvSpPr/>
-      </dsp:nvSpPr>
-      <dsp:spPr>
-        <a:xfrm rot="5400000">
-          <a:off x="1209716" y="706739"/>
-          <a:ext cx="2074985" cy="1805236"/>
-        </a:xfrm>
-        <a:prstGeom prst="hexagon">
-          <a:avLst>
-            <a:gd name="adj" fmla="val 25000"/>
-            <a:gd name="vf" fmla="val 115470"/>
-          </a:avLst>
-        </a:prstGeom>
-        <a:solidFill>
-          <a:schemeClr val="accent3">
-            <a:hueOff val="903533"/>
-            <a:satOff val="33333"/>
-            <a:lumOff val="-4902"/>
-            <a:alphaOff val="0"/>
-          </a:schemeClr>
-        </a:solidFill>
-        <a:ln w="12700" cap="flat" cmpd="sng" algn="ctr">
-          <a:solidFill>
-            <a:schemeClr val="lt1">
-              <a:hueOff val="0"/>
-              <a:satOff val="0"/>
-              <a:lumOff val="0"/>
-              <a:alphaOff val="0"/>
-            </a:schemeClr>
-          </a:solidFill>
-          <a:prstDash val="solid"/>
-          <a:miter lim="800000"/>
-        </a:ln>
-        <a:effectLst/>
-      </dsp:spPr>
-      <dsp:style>
-        <a:lnRef idx="2">
-          <a:scrgbClr r="0" g="0" b="0"/>
-        </a:lnRef>
-        <a:fillRef idx="1">
-          <a:scrgbClr r="0" g="0" b="0"/>
-        </a:fillRef>
-        <a:effectRef idx="0">
-          <a:scrgbClr r="0" g="0" b="0"/>
-        </a:effectRef>
-        <a:fontRef idx="minor">
-          <a:schemeClr val="lt1"/>
-        </a:fontRef>
-      </dsp:style>
-      <dsp:txBody>
-        <a:bodyPr spcFirstLastPara="0" vert="horz" wrap="square" lIns="0" tIns="0" rIns="0" bIns="0" numCol="1" spcCol="1270" anchor="ctr" anchorCtr="0">
-          <a:noAutofit/>
-        </a:bodyPr>
-        <a:lstStyle/>
-        <a:p>
-          <a:pPr lvl="0" algn="ctr" defTabSz="1600200">
-            <a:lnSpc>
-              <a:spcPct val="90000"/>
-            </a:lnSpc>
-            <a:spcBef>
-              <a:spcPct val="0"/>
-            </a:spcBef>
-            <a:spcAft>
-              <a:spcPct val="35000"/>
-            </a:spcAft>
-          </a:pPr>
-          <a:r>
-            <a:rPr lang="fr-FR" sz="3600" kern="1200" dirty="0" err="1" smtClean="0"/>
-            <a:t>Users</a:t>
-          </a:r>
-          <a:endParaRPr lang="fr-FR" sz="3600" kern="1200" dirty="0"/>
-        </a:p>
-      </dsp:txBody>
-      <dsp:txXfrm rot="-5400000">
-        <a:off x="1625906" y="895217"/>
-        <a:ext cx="1242604" cy="1428281"/>
-      </dsp:txXfrm>
-    </dsp:sp>
-    <dsp:sp modelId="{84D1921D-18E9-419A-B061-57FBC019CAF1}">
-      <dsp:nvSpPr>
-        <dsp:cNvPr id="0" name=""/>
-        <dsp:cNvSpPr/>
-      </dsp:nvSpPr>
-      <dsp:spPr>
-        <a:xfrm rot="5400000">
-          <a:off x="2180809" y="2467987"/>
-          <a:ext cx="2074985" cy="1805236"/>
-        </a:xfrm>
-        <a:prstGeom prst="hexagon">
-          <a:avLst>
-            <a:gd name="adj" fmla="val 25000"/>
-            <a:gd name="vf" fmla="val 115470"/>
-          </a:avLst>
-        </a:prstGeom>
-        <a:solidFill>
-          <a:schemeClr val="accent3">
-            <a:hueOff val="1807066"/>
-            <a:satOff val="66667"/>
-            <a:lumOff val="-9804"/>
-            <a:alphaOff val="0"/>
-          </a:schemeClr>
-        </a:solidFill>
-        <a:ln w="12700" cap="flat" cmpd="sng" algn="ctr">
-          <a:solidFill>
-            <a:schemeClr val="lt1">
-              <a:hueOff val="0"/>
-              <a:satOff val="0"/>
-              <a:lumOff val="0"/>
-              <a:alphaOff val="0"/>
-            </a:schemeClr>
-          </a:solidFill>
-          <a:prstDash val="solid"/>
-          <a:miter lim="800000"/>
-        </a:ln>
-        <a:effectLst/>
-      </dsp:spPr>
-      <dsp:style>
-        <a:lnRef idx="2">
-          <a:scrgbClr r="0" g="0" b="0"/>
-        </a:lnRef>
-        <a:fillRef idx="1">
-          <a:scrgbClr r="0" g="0" b="0"/>
-        </a:fillRef>
-        <a:effectRef idx="0">
-          <a:scrgbClr r="0" g="0" b="0"/>
-        </a:effectRef>
-        <a:fontRef idx="minor">
-          <a:schemeClr val="lt1"/>
-        </a:fontRef>
-      </dsp:style>
-      <dsp:txBody>
-        <a:bodyPr spcFirstLastPara="0" vert="horz" wrap="square" lIns="60960" tIns="60960" rIns="60960" bIns="60960" numCol="1" spcCol="1270" anchor="ctr" anchorCtr="0">
-          <a:noAutofit/>
-        </a:bodyPr>
-        <a:lstStyle/>
-        <a:p>
-          <a:pPr lvl="0" algn="ctr" defTabSz="711200">
-            <a:lnSpc>
-              <a:spcPct val="90000"/>
-            </a:lnSpc>
-            <a:spcBef>
-              <a:spcPct val="0"/>
-            </a:spcBef>
-            <a:spcAft>
-              <a:spcPct val="35000"/>
-            </a:spcAft>
-          </a:pPr>
-          <a:r>
-            <a:rPr lang="fr-FR" sz="1600" kern="1200" dirty="0" smtClean="0"/>
-            <a:t>Comptabilité</a:t>
-          </a:r>
-          <a:endParaRPr lang="fr-FR" sz="1600" kern="1200" dirty="0"/>
-        </a:p>
-      </dsp:txBody>
-      <dsp:txXfrm rot="-5400000">
-        <a:off x="2596999" y="2656465"/>
-        <a:ext cx="1242604" cy="1428281"/>
-      </dsp:txXfrm>
-    </dsp:sp>
-    <dsp:sp modelId="{731019A7-D36B-4797-AC81-A728523341B7}">
-      <dsp:nvSpPr>
-        <dsp:cNvPr id="0" name=""/>
-        <dsp:cNvSpPr/>
-      </dsp:nvSpPr>
-      <dsp:spPr>
-        <a:xfrm>
-          <a:off x="0" y="2748110"/>
-          <a:ext cx="2240983" cy="1244991"/>
-        </a:xfrm>
-        <a:prstGeom prst="rect">
-          <a:avLst/>
-        </a:prstGeom>
-        <a:noFill/>
-        <a:ln>
-          <a:noFill/>
-        </a:ln>
-        <a:effectLst/>
-      </dsp:spPr>
-      <dsp:style>
-        <a:lnRef idx="0">
-          <a:scrgbClr r="0" g="0" b="0"/>
-        </a:lnRef>
-        <a:fillRef idx="0">
-          <a:scrgbClr r="0" g="0" b="0"/>
-        </a:fillRef>
-        <a:effectRef idx="0">
-          <a:scrgbClr r="0" g="0" b="0"/>
-        </a:effectRef>
-        <a:fontRef idx="minor"/>
-      </dsp:style>
-    </dsp:sp>
-    <dsp:sp modelId="{3B1D33B9-0603-40AB-8084-FCB436366988}">
-      <dsp:nvSpPr>
-        <dsp:cNvPr id="0" name=""/>
-        <dsp:cNvSpPr/>
-      </dsp:nvSpPr>
-      <dsp:spPr>
-        <a:xfrm rot="5400000">
-          <a:off x="4130465" y="2467987"/>
-          <a:ext cx="2074985" cy="1805236"/>
-        </a:xfrm>
-        <a:prstGeom prst="hexagon">
-          <a:avLst>
-            <a:gd name="adj" fmla="val 25000"/>
-            <a:gd name="vf" fmla="val 115470"/>
-          </a:avLst>
-        </a:prstGeom>
-        <a:solidFill>
-          <a:schemeClr val="accent3">
-            <a:hueOff val="2710599"/>
-            <a:satOff val="100000"/>
-            <a:lumOff val="-14706"/>
-            <a:alphaOff val="0"/>
-          </a:schemeClr>
-        </a:solidFill>
-        <a:ln w="12700" cap="flat" cmpd="sng" algn="ctr">
-          <a:solidFill>
-            <a:schemeClr val="lt1">
-              <a:hueOff val="0"/>
-              <a:satOff val="0"/>
-              <a:lumOff val="0"/>
-              <a:alphaOff val="0"/>
-            </a:schemeClr>
-          </a:solidFill>
-          <a:prstDash val="solid"/>
-          <a:miter lim="800000"/>
-        </a:ln>
-        <a:effectLst/>
-      </dsp:spPr>
-      <dsp:style>
-        <a:lnRef idx="2">
-          <a:scrgbClr r="0" g="0" b="0"/>
-        </a:lnRef>
-        <a:fillRef idx="1">
-          <a:scrgbClr r="0" g="0" b="0"/>
-        </a:fillRef>
-        <a:effectRef idx="0">
-          <a:scrgbClr r="0" g="0" b="0"/>
-        </a:effectRef>
-        <a:fontRef idx="minor">
-          <a:schemeClr val="lt1"/>
-        </a:fontRef>
-      </dsp:style>
-      <dsp:txBody>
-        <a:bodyPr spcFirstLastPara="0" vert="horz" wrap="square" lIns="0" tIns="0" rIns="0" bIns="0" numCol="1" spcCol="1270" anchor="ctr" anchorCtr="0">
-          <a:noAutofit/>
-        </a:bodyPr>
-        <a:lstStyle/>
-        <a:p>
-          <a:pPr lvl="0" algn="ctr" defTabSz="1600200">
-            <a:lnSpc>
-              <a:spcPct val="90000"/>
-            </a:lnSpc>
-            <a:spcBef>
-              <a:spcPct val="0"/>
-            </a:spcBef>
-            <a:spcAft>
-              <a:spcPct val="35000"/>
-            </a:spcAft>
-          </a:pPr>
-          <a:r>
-            <a:rPr lang="fr-FR" sz="3600" kern="1200" dirty="0" smtClean="0"/>
-            <a:t>REST</a:t>
-          </a:r>
-          <a:endParaRPr lang="fr-FR" sz="3600" kern="1200" dirty="0"/>
-        </a:p>
-      </dsp:txBody>
-      <dsp:txXfrm rot="-5400000">
-        <a:off x="4546655" y="2656465"/>
-        <a:ext cx="1242604" cy="1428281"/>
-      </dsp:txXfrm>
-    </dsp:sp>
-  </dsp:spTree>
-</dsp:drawing>
-</file>
-
 <file path=ppt/diagrams/layout1.xml><?xml version="1.0" encoding="utf-8"?>
-<dgm:layoutDef xmlns:dgm="http://schemas.openxmlformats.org/drawingml/2006/diagram" xmlns:a="http://schemas.openxmlformats.org/drawingml/2006/main" uniqueId="urn:microsoft.com/office/officeart/2008/layout/AlternatingHexagons">
-  <dgm:title val=""/>
-  <dgm:desc val=""/>
-  <dgm:catLst>
-    <dgm:cat type="list" pri="1500"/>
-  </dgm:catLst>
-  <dgm:sampData>
-    <dgm:dataModel>
-      <dgm:ptLst>
-        <dgm:pt modelId="0" type="doc"/>
-        <dgm:pt modelId="10">
-          <dgm:prSet phldr="1"/>
-        </dgm:pt>
-        <dgm:pt modelId="11">
-          <dgm:prSet phldr="1"/>
-        </dgm:pt>
-        <dgm:pt modelId="20">
-          <dgm:prSet phldr="1"/>
-        </dgm:pt>
-        <dgm:pt modelId="21">
-          <dgm:prSet phldr="1"/>
-        </dgm:pt>
-        <dgm:pt modelId="30">
-          <dgm:prSet phldr="1"/>
-        </dgm:pt>
-        <dgm:pt modelId="31">
-          <dgm:prSet phldr="1"/>
-        </dgm:pt>
-      </dgm:ptLst>
-      <dgm:cxnLst>
-        <dgm:cxn modelId="40" srcId="0" destId="10" srcOrd="0" destOrd="0"/>
-        <dgm:cxn modelId="12" srcId="10" destId="11" srcOrd="0" destOrd="0"/>
-        <dgm:cxn modelId="50" srcId="0" destId="20" srcOrd="1" destOrd="0"/>
-        <dgm:cxn modelId="22" srcId="20" destId="21" srcOrd="0" destOrd="0"/>
-        <dgm:cxn modelId="60" srcId="0" destId="30" srcOrd="1" destOrd="0"/>
-        <dgm:cxn modelId="32" srcId="30" destId="31" srcOrd="0" destOrd="0"/>
-      </dgm:cxnLst>
-      <dgm:bg/>
-      <dgm:whole/>
-    </dgm:dataModel>
-  </dgm:sampData>
-  <dgm:styleData>
-    <dgm:dataModel>
-      <dgm:ptLst>
-        <dgm:pt modelId="0" type="doc"/>
-        <dgm:pt modelId="10">
-          <dgm:prSet phldr="1"/>
-        </dgm:pt>
-        <dgm:pt modelId="20">
-          <dgm:prSet phldr="1"/>
-        </dgm:pt>
-      </dgm:ptLst>
-      <dgm:cxnLst>
-        <dgm:cxn modelId="60" srcId="0" destId="10" srcOrd="0" destOrd="0"/>
-        <dgm:cxn modelId="70" srcId="0" destId="20" srcOrd="1" destOrd="0"/>
-      </dgm:cxnLst>
-      <dgm:bg/>
-      <dgm:whole/>
-    </dgm:dataModel>
-  </dgm:styleData>
-  <dgm:clrData>
-    <dgm:dataModel>
-      <dgm:ptLst>
-        <dgm:pt modelId="0" type="doc"/>
-        <dgm:pt modelId="10">
-          <dgm:prSet phldr="1"/>
-        </dgm:pt>
-        <dgm:pt modelId="20">
-          <dgm:prSet phldr="1"/>
-        </dgm:pt>
-        <dgm:pt modelId="30">
-          <dgm:prSet phldr="1"/>
-        </dgm:pt>
-        <dgm:pt modelId="40">
-          <dgm:prSet phldr="1"/>
-        </dgm:pt>
-      </dgm:ptLst>
-      <dgm:cxnLst>
-        <dgm:cxn modelId="60" srcId="0" destId="10" srcOrd="0" destOrd="0"/>
-        <dgm:cxn modelId="70" srcId="0" destId="20" srcOrd="1" destOrd="0"/>
-        <dgm:cxn modelId="80" srcId="0" destId="30" srcOrd="2" destOrd="0"/>
-        <dgm:cxn modelId="90" srcId="0" destId="40" srcOrd="3" destOrd="0"/>
-      </dgm:cxnLst>
-      <dgm:bg/>
-      <dgm:whole/>
-    </dgm:dataModel>
-  </dgm:clrData>
-  <dgm:layoutNode name="Name0">
-    <dgm:varLst>
-      <dgm:chMax/>
-      <dgm:chPref/>
-      <dgm:dir/>
-      <dgm:animLvl val="lvl"/>
-    </dgm:varLst>
-    <dgm:alg type="lin">
-      <dgm:param type="linDir" val="fromT"/>
-    </dgm:alg>
-    <dgm:shape xmlns:r="http://schemas.openxmlformats.org/officeDocument/2006/relationships" r:blip="">
-      <dgm:adjLst/>
-    </dgm:shape>
-    <dgm:constrLst>
-      <dgm:constr type="primFontSz" for="des" forName="Parent1" val="65"/>
-      <dgm:constr type="primFontSz" for="des" forName="Childtext1" refType="primFontSz" refFor="des" refForName="Parent1" op="lte"/>
-      <dgm:constr type="w" for="ch" forName="composite" refType="w"/>
-      <dgm:constr type="h" for="ch" forName="composite" refType="h"/>
-      <dgm:constr type="h" for="ch" forName="spaceBetweenRectangles" refType="w" refFor="ch" refForName="composite" fact="-0.042"/>
-      <dgm:constr type="sp" refType="h" refFor="ch" refForName="composite" op="equ" fact="0.1"/>
-    </dgm:constrLst>
-    <dgm:forEach name="nodesForEach" axis="ch" ptType="node">
-      <dgm:layoutNode name="composite">
-        <dgm:alg type="composite">
-          <dgm:param type="ar" val="3.6"/>
-        </dgm:alg>
-        <dgm:shape xmlns:r="http://schemas.openxmlformats.org/officeDocument/2006/relationships" r:blip="">
-          <dgm:adjLst/>
-        </dgm:shape>
-        <dgm:choose name="Name1">
-          <dgm:if name="Name2" func="var" arg="dir" op="equ" val="norm">
-            <dgm:choose name="Name3">
-              <dgm:if name="Name4" axis="self" ptType="node" func="posOdd" op="equ" val="1">
-                <dgm:constrLst>
-                  <dgm:constr type="l" for="ch" forName="Accent1" refType="w" fact="0.18"/>
-                  <dgm:constr type="t" for="ch" forName="Accent1" refType="h" fact="0"/>
-                  <dgm:constr type="h" for="ch" forName="Accent1" refType="h"/>
-                  <dgm:constr type="w" for="ch" forName="Accent1" refType="h" fact="0.87"/>
-                  <dgm:constr type="l" for="ch" forName="Accent1Text" refType="w" fact="0.18"/>
-                  <dgm:constr type="t" for="ch" forName="Accent1Text" refType="h" fact="0"/>
-                  <dgm:constr type="h" for="ch" forName="Accent1Text" refType="h"/>
-                  <dgm:constr type="w" for="ch" forName="Accent1Text" refType="h" fact="0.87"/>
-                  <dgm:constr type="l" for="ch" forName="Parent1" refType="w" fact="0.441"/>
-                  <dgm:constr type="t" for="ch" forName="Parent1" refType="h" fact="0"/>
-                  <dgm:constr type="h" for="ch" forName="Parent1" refType="h"/>
-                  <dgm:constr type="w" for="ch" forName="Parent1" refType="h" fact="0.87"/>
-                  <dgm:constr type="l" for="ch" forName="Childtext1" refType="w" fact="0.69"/>
-                  <dgm:constr type="t" for="ch" forName="Childtext1" refType="h" fact="0.2"/>
-                  <dgm:constr type="w" for="ch" forName="Childtext1" refType="w" fact="0.31"/>
-                  <dgm:constr type="h" for="ch" forName="Childtext1" refType="h" fact="0.6"/>
-                  <dgm:constr type="l" for="ch" forName="BalanceSpacing" refType="w" fact="0"/>
-                  <dgm:constr type="t" for="ch" forName="BalanceSpacing" refType="h" fact="0"/>
-                  <dgm:constr type="w" for="ch" forName="BalanceSpacing" refType="w"/>
-                  <dgm:constr type="h" for="ch" forName="BalanceSpacing" refType="h" fact="0.1"/>
-                  <dgm:constr type="l" for="ch" forName="BalanceSpacing1" refType="w" fact="0.69"/>
-                  <dgm:constr type="t" for="ch" forName="BalanceSpacing1" refType="h" fact="0.2"/>
-                  <dgm:constr type="w" for="ch" forName="BalanceSpacing1" refType="w" fact="0.31"/>
-                  <dgm:constr type="h" for="ch" forName="BalanceSpacing1" refType="h" fact="0.6"/>
-                </dgm:constrLst>
-              </dgm:if>
-              <dgm:else name="Name5">
-                <dgm:constrLst>
-                  <dgm:constr type="l" for="ch" forName="Accent1" refType="w" fact="0.571"/>
-                  <dgm:constr type="t" for="ch" forName="Accent1" refType="h" fact="0"/>
-                  <dgm:constr type="h" for="ch" forName="Accent1" refType="h"/>
-                  <dgm:constr type="w" for="ch" forName="Accent1" refType="h" fact="0.87"/>
-                  <dgm:constr type="l" for="ch" forName="Accent1Text" refType="w" fact="0.571"/>
-                  <dgm:constr type="t" for="ch" forName="Accent1Text" refType="h" fact="0"/>
-                  <dgm:constr type="h" for="ch" forName="Accent1Text" refType="h"/>
-                  <dgm:constr type="w" for="ch" forName="Accent1Text" refType="h" fact="0.87"/>
-                  <dgm:constr type="l" for="ch" forName="Parent1" refType="w" fact="0.31"/>
-                  <dgm:constr type="t" for="ch" forName="Parent1" refType="h" fact="0"/>
-                  <dgm:constr type="h" for="ch" forName="Parent1" refType="h"/>
-                  <dgm:constr type="w" for="ch" forName="Parent1" refType="h" fact="0.87"/>
-                  <dgm:constr type="l" for="ch" forName="Childtext1" refType="w" fact="0"/>
-                  <dgm:constr type="t" for="ch" forName="Childtext1" refType="h" fact="0.2"/>
-                  <dgm:constr type="w" for="ch" forName="Childtext1" refType="w" fact="0.3"/>
-                  <dgm:constr type="h" for="ch" forName="Childtext1" refType="h" fact="0.6"/>
-                  <dgm:constr type="l" for="ch" forName="BalanceSpacing" refType="w" fact="0.82"/>
-                  <dgm:constr type="t" for="ch" forName="BalanceSpacing" refType="h" fact="0"/>
-                  <dgm:constr type="w" for="ch" forName="BalanceSpacing" refType="w" fact="0.18"/>
-                  <dgm:constr type="h" for="ch" forName="BalanceSpacing" refType="h"/>
-                  <dgm:constr type="l" for="ch" forName="BalanceSpacing1" refType="w" fact="0"/>
-                  <dgm:constr type="t" for="ch" forName="BalanceSpacing1" refType="h" fact="0.2"/>
-                  <dgm:constr type="w" for="ch" forName="BalanceSpacing1" refType="w" fact="0.3"/>
-                  <dgm:constr type="h" for="ch" forName="BalanceSpacing1" refType="h" fact="0.6"/>
-                </dgm:constrLst>
-              </dgm:else>
-            </dgm:choose>
-          </dgm:if>
-          <dgm:else name="Name6">
-            <dgm:choose name="Name7">
-              <dgm:if name="Name8" axis="self" ptType="node" func="posOdd" op="equ" val="1">
-                <dgm:constrLst>
-                  <dgm:constr type="l" for="ch" forName="Accent1" refType="w" fact="0.571"/>
-                  <dgm:constr type="t" for="ch" forName="Accent1" refType="h" fact="0"/>
-                  <dgm:constr type="h" for="ch" forName="Accent1" refType="h"/>
-                  <dgm:constr type="w" for="ch" forName="Accent1" refType="h" fact="0.87"/>
-                  <dgm:constr type="l" for="ch" forName="Accent1Text" refType="w" fact="0.571"/>
-                  <dgm:constr type="t" for="ch" forName="Accent1Text" refType="h" fact="0"/>
-                  <dgm:constr type="h" for="ch" forName="Accent1Text" refType="h"/>
-                  <dgm:constr type="w" for="ch" forName="Accent1Text" refType="h" fact="0.87"/>
-                  <dgm:constr type="l" for="ch" forName="Parent1" refType="w" fact="0.31"/>
-                  <dgm:constr type="t" for="ch" forName="Parent1" refType="h" fact="0"/>
-                  <dgm:constr type="h" for="ch" forName="Parent1" refType="h"/>
-                  <dgm:constr type="w" for="ch" forName="Parent1" refType="h" fact="0.87"/>
-                  <dgm:constr type="l" for="ch" forName="Childtext1" refType="w" fact="0"/>
-                  <dgm:constr type="t" for="ch" forName="Childtext1" refType="h" fact="0.2"/>
-                  <dgm:constr type="w" for="ch" forName="Childtext1" refType="w" fact="0.3"/>
-                  <dgm:constr type="h" for="ch" forName="Childtext1" refType="h" fact="0.6"/>
-                  <dgm:constr type="l" for="ch" forName="BalanceSpacing" refType="w" fact="0.82"/>
-                  <dgm:constr type="t" for="ch" forName="BalanceSpacing" refType="h" fact="0"/>
-                  <dgm:constr type="w" for="ch" forName="BalanceSpacing" refType="w" fact="0.18"/>
-                  <dgm:constr type="h" for="ch" forName="BalanceSpacing" refType="h"/>
-                </dgm:constrLst>
-              </dgm:if>
-              <dgm:else name="Name9">
-                <dgm:constrLst>
-                  <dgm:constr type="l" for="ch" forName="Accent1" refType="w" fact="0.18"/>
-                  <dgm:constr type="t" for="ch" forName="Accent1" refType="h" fact="0"/>
-                  <dgm:constr type="h" for="ch" forName="Accent1" refType="h"/>
-                  <dgm:constr type="w" for="ch" forName="Accent1" refType="h" fact="0.87"/>
-                  <dgm:constr type="l" for="ch" forName="Accent1Text" refType="w" fact="0.18"/>
-                  <dgm:constr type="t" for="ch" forName="Accent1Text" refType="h" fact="0"/>
-                  <dgm:constr type="h" for="ch" forName="Accent1Text" refType="h"/>
-                  <dgm:constr type="w" for="ch" forName="Accent1Text" refType="h" fact="0.87"/>
-                  <dgm:constr type="l" for="ch" forName="Parent1" refType="w" fact="0.441"/>
-                  <dgm:constr type="t" for="ch" forName="Parent1" refType="h" fact="0"/>
-                  <dgm:constr type="h" for="ch" forName="Parent1" refType="h"/>
-                  <dgm:constr type="w" for="ch" forName="Parent1" refType="h" fact="0.87"/>
-                  <dgm:constr type="l" for="ch" forName="Childtext1" refType="w" fact="0.69"/>
-                  <dgm:constr type="t" for="ch" forName="Childtext1" refType="h" fact="0.2"/>
-                  <dgm:constr type="w" for="ch" forName="Childtext1" refType="w" fact="0.31"/>
-                  <dgm:constr type="h" for="ch" forName="Childtext1" refType="h" fact="0.6"/>
-                  <dgm:constr type="l" for="ch" forName="BalanceSpacing" refType="w" fact="0"/>
-                  <dgm:constr type="t" for="ch" forName="BalanceSpacing" refType="h" fact="0"/>
-                  <dgm:constr type="w" for="ch" forName="BalanceSpacing" refType="w" fact="0.18"/>
-                  <dgm:constr type="h" for="ch" forName="BalanceSpacing" refType="h"/>
-                </dgm:constrLst>
-              </dgm:else>
-            </dgm:choose>
-          </dgm:else>
-        </dgm:choose>
-        <dgm:layoutNode name="Parent1" styleLbl="node1">
-          <dgm:varLst>
-            <dgm:chMax val="1"/>
-            <dgm:chPref val="1"/>
-            <dgm:bulletEnabled val="1"/>
-          </dgm:varLst>
-          <dgm:alg type="tx"/>
-          <dgm:shape xmlns:r="http://schemas.openxmlformats.org/officeDocument/2006/relationships" rot="90" type="hexagon" r:blip="">
-            <dgm:adjLst>
-              <dgm:adj idx="1" val="0.25"/>
-              <dgm:adj idx="2" val="1.1547"/>
-            </dgm:adjLst>
-          </dgm:shape>
-          <dgm:presOf axis="self" ptType="node"/>
-          <dgm:constrLst>
-            <dgm:constr type="lMarg" refType="primFontSz" fact="0.3"/>
-            <dgm:constr type="rMarg" refType="primFontSz" fact="0.3"/>
-            <dgm:constr type="tMarg" refType="primFontSz" fact="0.3"/>
-            <dgm:constr type="bMarg" refType="primFontSz" fact="0.3"/>
-          </dgm:constrLst>
-          <dgm:ruleLst>
-            <dgm:rule type="primFontSz" val="5" fact="NaN" max="NaN"/>
-          </dgm:ruleLst>
-        </dgm:layoutNode>
-        <dgm:layoutNode name="Childtext1" styleLbl="revTx">
-          <dgm:varLst>
-            <dgm:chMax val="0"/>
-            <dgm:chPref val="0"/>
-            <dgm:bulletEnabled val="1"/>
-          </dgm:varLst>
-          <dgm:choose name="Name10">
-            <dgm:if name="Name11" func="var" arg="dir" op="equ" val="norm">
-              <dgm:choose name="Name12">
-                <dgm:if name="Name13" axis="self" ptType="node" func="posOdd" op="equ" val="1">
-                  <dgm:alg type="tx">
-                    <dgm:param type="parTxLTRAlign" val="l"/>
-                  </dgm:alg>
-                </dgm:if>
-                <dgm:else name="Name14">
-                  <dgm:alg type="tx">
-                    <dgm:param type="parTxLTRAlign" val="r"/>
-                  </dgm:alg>
-                </dgm:else>
-              </dgm:choose>
-            </dgm:if>
-            <dgm:else name="Name15">
-              <dgm:choose name="Name16">
-                <dgm:if name="Name17" axis="self" ptType="node" func="posOdd" op="equ" val="1">
-                  <dgm:alg type="tx">
-                    <dgm:param type="parTxLTRAlign" val="r"/>
-                  </dgm:alg>
-                </dgm:if>
-                <dgm:else name="Name18">
-                  <dgm:alg type="tx">
-                    <dgm:param type="parTxLTRAlign" val="l"/>
-                  </dgm:alg>
-                </dgm:else>
-              </dgm:choose>
-            </dgm:else>
-          </dgm:choose>
-          <dgm:shape xmlns:r="http://schemas.openxmlformats.org/officeDocument/2006/relationships" type="rect" r:blip="">
-            <dgm:adjLst/>
-          </dgm:shape>
-          <dgm:presOf axis="des" ptType="node"/>
-          <dgm:constrLst>
-            <dgm:constr type="lMarg" refType="primFontSz" fact="0.3"/>
-            <dgm:constr type="rMarg" refType="primFontSz" fact="0.3"/>
-            <dgm:constr type="tMarg" refType="primFontSz" fact="0.3"/>
-            <dgm:constr type="bMarg" refType="primFontSz" fact="0.3"/>
-          </dgm:constrLst>
-          <dgm:ruleLst>
-            <dgm:rule type="primFontSz" val="5" fact="NaN" max="NaN"/>
-          </dgm:ruleLst>
-        </dgm:layoutNode>
-        <dgm:layoutNode name="BalanceSpacing">
-          <dgm:alg type="sp"/>
-          <dgm:shape xmlns:r="http://schemas.openxmlformats.org/officeDocument/2006/relationships" r:blip="">
-            <dgm:adjLst/>
-          </dgm:shape>
-        </dgm:layoutNode>
-        <dgm:layoutNode name="BalanceSpacing1">
-          <dgm:alg type="sp"/>
-          <dgm:shape xmlns:r="http://schemas.openxmlformats.org/officeDocument/2006/relationships" r:blip="">
-            <dgm:adjLst/>
-          </dgm:shape>
-        </dgm:layoutNode>
-        <dgm:forEach name="Name19" axis="followSib" ptType="sibTrans" hideLastTrans="0" cnt="1">
-          <dgm:layoutNode name="Accent1Text" styleLbl="node1">
-            <dgm:alg type="tx"/>
-            <dgm:shape xmlns:r="http://schemas.openxmlformats.org/officeDocument/2006/relationships" rot="90" type="hexagon" r:blip="">
-              <dgm:adjLst>
-                <dgm:adj idx="1" val="0.25"/>
-                <dgm:adj idx="2" val="1.1547"/>
-              </dgm:adjLst>
-            </dgm:shape>
-            <dgm:presOf axis="self" ptType="sibTrans"/>
-            <dgm:constrLst>
-              <dgm:constr type="lMarg"/>
-              <dgm:constr type="rMarg"/>
-              <dgm:constr type="tMarg"/>
-              <dgm:constr type="bMarg"/>
-            </dgm:constrLst>
-            <dgm:ruleLst>
-              <dgm:rule type="primFontSz" val="5" fact="NaN" max="NaN"/>
-            </dgm:ruleLst>
-          </dgm:layoutNode>
-        </dgm:forEach>
-      </dgm:layoutNode>
-      <dgm:forEach name="Name20" axis="followSib" ptType="sibTrans" cnt="1">
-        <dgm:layoutNode name="spaceBetweenRectangles">
-          <dgm:alg type="sp"/>
-          <dgm:shape xmlns:r="http://schemas.openxmlformats.org/officeDocument/2006/relationships" r:blip="">
-            <dgm:adjLst/>
-          </dgm:shape>
-          <dgm:presOf/>
-          <dgm:constrLst/>
-          <dgm:ruleLst/>
-        </dgm:layoutNode>
-      </dgm:forEach>
-    </dgm:forEach>
-  </dgm:layoutNode>
-</dgm:layoutDef>
-</file>
-
-<file path=ppt/diagrams/layout2.xml><?xml version="1.0" encoding="utf-8"?>
 <dgm:layoutDef xmlns:dgm="http://schemas.openxmlformats.org/drawingml/2006/diagram" xmlns:a="http://schemas.openxmlformats.org/drawingml/2006/main" uniqueId="urn:microsoft.com/office/officeart/2008/layout/AlternatingHexagons">
   <dgm:title val=""/>
   <dgm:desc val=""/>
@@ -5031,1040 +3257,6 @@
 </dgm:styleDef>
 </file>
 
-<file path=ppt/diagrams/quickStyle2.xml><?xml version="1.0" encoding="utf-8"?>
-<dgm:styleDef xmlns:dgm="http://schemas.openxmlformats.org/drawingml/2006/diagram" xmlns:a="http://schemas.openxmlformats.org/drawingml/2006/main" uniqueId="urn:microsoft.com/office/officeart/2005/8/quickstyle/simple1">
-  <dgm:title val=""/>
-  <dgm:desc val=""/>
-  <dgm:catLst>
-    <dgm:cat type="simple" pri="10100"/>
-  </dgm:catLst>
-  <dgm:scene3d>
-    <a:camera prst="orthographicFront"/>
-    <a:lightRig rig="threePt" dir="t"/>
-  </dgm:scene3d>
-  <dgm:styleLbl name="node0">
-    <dgm:scene3d>
-      <a:camera prst="orthographicFront"/>
-      <a:lightRig rig="threePt" dir="t"/>
-    </dgm:scene3d>
-    <dgm:sp3d/>
-    <dgm:txPr/>
-    <dgm:style>
-      <a:lnRef idx="2">
-        <a:scrgbClr r="0" g="0" b="0"/>
-      </a:lnRef>
-      <a:fillRef idx="1">
-        <a:scrgbClr r="0" g="0" b="0"/>
-      </a:fillRef>
-      <a:effectRef idx="0">
-        <a:scrgbClr r="0" g="0" b="0"/>
-      </a:effectRef>
-      <a:fontRef idx="minor">
-        <a:schemeClr val="lt1"/>
-      </a:fontRef>
-    </dgm:style>
-  </dgm:styleLbl>
-  <dgm:styleLbl name="lnNode1">
-    <dgm:scene3d>
-      <a:camera prst="orthographicFront"/>
-      <a:lightRig rig="threePt" dir="t"/>
-    </dgm:scene3d>
-    <dgm:sp3d/>
-    <dgm:txPr/>
-    <dgm:style>
-      <a:lnRef idx="2">
-        <a:scrgbClr r="0" g="0" b="0"/>
-      </a:lnRef>
-      <a:fillRef idx="1">
-        <a:scrgbClr r="0" g="0" b="0"/>
-      </a:fillRef>
-      <a:effectRef idx="0">
-        <a:scrgbClr r="0" g="0" b="0"/>
-      </a:effectRef>
-      <a:fontRef idx="minor">
-        <a:schemeClr val="lt1"/>
-      </a:fontRef>
-    </dgm:style>
-  </dgm:styleLbl>
-  <dgm:styleLbl name="vennNode1">
-    <dgm:scene3d>
-      <a:camera prst="orthographicFront"/>
-      <a:lightRig rig="threePt" dir="t"/>
-    </dgm:scene3d>
-    <dgm:sp3d/>
-    <dgm:txPr/>
-    <dgm:style>
-      <a:lnRef idx="2">
-        <a:scrgbClr r="0" g="0" b="0"/>
-      </a:lnRef>
-      <a:fillRef idx="1">
-        <a:scrgbClr r="0" g="0" b="0"/>
-      </a:fillRef>
-      <a:effectRef idx="0">
-        <a:scrgbClr r="0" g="0" b="0"/>
-      </a:effectRef>
-      <a:fontRef idx="minor">
-        <a:schemeClr val="tx1"/>
-      </a:fontRef>
-    </dgm:style>
-  </dgm:styleLbl>
-  <dgm:styleLbl name="alignNode1">
-    <dgm:scene3d>
-      <a:camera prst="orthographicFront"/>
-      <a:lightRig rig="threePt" dir="t"/>
-    </dgm:scene3d>
-    <dgm:sp3d/>
-    <dgm:txPr/>
-    <dgm:style>
-      <a:lnRef idx="2">
-        <a:scrgbClr r="0" g="0" b="0"/>
-      </a:lnRef>
-      <a:fillRef idx="1">
-        <a:scrgbClr r="0" g="0" b="0"/>
-      </a:fillRef>
-      <a:effectRef idx="0">
-        <a:scrgbClr r="0" g="0" b="0"/>
-      </a:effectRef>
-      <a:fontRef idx="minor">
-        <a:schemeClr val="lt1"/>
-      </a:fontRef>
-    </dgm:style>
-  </dgm:styleLbl>
-  <dgm:styleLbl name="node1">
-    <dgm:scene3d>
-      <a:camera prst="orthographicFront"/>
-      <a:lightRig rig="threePt" dir="t"/>
-    </dgm:scene3d>
-    <dgm:sp3d/>
-    <dgm:txPr/>
-    <dgm:style>
-      <a:lnRef idx="2">
-        <a:scrgbClr r="0" g="0" b="0"/>
-      </a:lnRef>
-      <a:fillRef idx="1">
-        <a:scrgbClr r="0" g="0" b="0"/>
-      </a:fillRef>
-      <a:effectRef idx="0">
-        <a:scrgbClr r="0" g="0" b="0"/>
-      </a:effectRef>
-      <a:fontRef idx="minor">
-        <a:schemeClr val="lt1"/>
-      </a:fontRef>
-    </dgm:style>
-  </dgm:styleLbl>
-  <dgm:styleLbl name="node2">
-    <dgm:scene3d>
-      <a:camera prst="orthographicFront"/>
-      <a:lightRig rig="threePt" dir="t"/>
-    </dgm:scene3d>
-    <dgm:sp3d/>
-    <dgm:txPr/>
-    <dgm:style>
-      <a:lnRef idx="2">
-        <a:scrgbClr r="0" g="0" b="0"/>
-      </a:lnRef>
-      <a:fillRef idx="1">
-        <a:scrgbClr r="0" g="0" b="0"/>
-      </a:fillRef>
-      <a:effectRef idx="0">
-        <a:scrgbClr r="0" g="0" b="0"/>
-      </a:effectRef>
-      <a:fontRef idx="minor">
-        <a:schemeClr val="lt1"/>
-      </a:fontRef>
-    </dgm:style>
-  </dgm:styleLbl>
-  <dgm:styleLbl name="node3">
-    <dgm:scene3d>
-      <a:camera prst="orthographicFront"/>
-      <a:lightRig rig="threePt" dir="t"/>
-    </dgm:scene3d>
-    <dgm:sp3d/>
-    <dgm:txPr/>
-    <dgm:style>
-      <a:lnRef idx="2">
-        <a:scrgbClr r="0" g="0" b="0"/>
-      </a:lnRef>
-      <a:fillRef idx="1">
-        <a:scrgbClr r="0" g="0" b="0"/>
-      </a:fillRef>
-      <a:effectRef idx="0">
-        <a:scrgbClr r="0" g="0" b="0"/>
-      </a:effectRef>
-      <a:fontRef idx="minor">
-        <a:schemeClr val="lt1"/>
-      </a:fontRef>
-    </dgm:style>
-  </dgm:styleLbl>
-  <dgm:styleLbl name="node4">
-    <dgm:scene3d>
-      <a:camera prst="orthographicFront"/>
-      <a:lightRig rig="threePt" dir="t"/>
-    </dgm:scene3d>
-    <dgm:sp3d/>
-    <dgm:txPr/>
-    <dgm:style>
-      <a:lnRef idx="2">
-        <a:scrgbClr r="0" g="0" b="0"/>
-      </a:lnRef>
-      <a:fillRef idx="1">
-        <a:scrgbClr r="0" g="0" b="0"/>
-      </a:fillRef>
-      <a:effectRef idx="0">
-        <a:scrgbClr r="0" g="0" b="0"/>
-      </a:effectRef>
-      <a:fontRef idx="minor">
-        <a:schemeClr val="lt1"/>
-      </a:fontRef>
-    </dgm:style>
-  </dgm:styleLbl>
-  <dgm:styleLbl name="fgImgPlace1">
-    <dgm:scene3d>
-      <a:camera prst="orthographicFront"/>
-      <a:lightRig rig="threePt" dir="t"/>
-    </dgm:scene3d>
-    <dgm:sp3d/>
-    <dgm:txPr/>
-    <dgm:style>
-      <a:lnRef idx="2">
-        <a:scrgbClr r="0" g="0" b="0"/>
-      </a:lnRef>
-      <a:fillRef idx="1">
-        <a:scrgbClr r="0" g="0" b="0"/>
-      </a:fillRef>
-      <a:effectRef idx="0">
-        <a:scrgbClr r="0" g="0" b="0"/>
-      </a:effectRef>
-      <a:fontRef idx="minor"/>
-    </dgm:style>
-  </dgm:styleLbl>
-  <dgm:styleLbl name="alignImgPlace1">
-    <dgm:scene3d>
-      <a:camera prst="orthographicFront"/>
-      <a:lightRig rig="threePt" dir="t"/>
-    </dgm:scene3d>
-    <dgm:sp3d/>
-    <dgm:txPr/>
-    <dgm:style>
-      <a:lnRef idx="2">
-        <a:scrgbClr r="0" g="0" b="0"/>
-      </a:lnRef>
-      <a:fillRef idx="1">
-        <a:scrgbClr r="0" g="0" b="0"/>
-      </a:fillRef>
-      <a:effectRef idx="0">
-        <a:scrgbClr r="0" g="0" b="0"/>
-      </a:effectRef>
-      <a:fontRef idx="minor"/>
-    </dgm:style>
-  </dgm:styleLbl>
-  <dgm:styleLbl name="bgImgPlace1">
-    <dgm:scene3d>
-      <a:camera prst="orthographicFront"/>
-      <a:lightRig rig="threePt" dir="t"/>
-    </dgm:scene3d>
-    <dgm:sp3d/>
-    <dgm:txPr/>
-    <dgm:style>
-      <a:lnRef idx="2">
-        <a:scrgbClr r="0" g="0" b="0"/>
-      </a:lnRef>
-      <a:fillRef idx="1">
-        <a:scrgbClr r="0" g="0" b="0"/>
-      </a:fillRef>
-      <a:effectRef idx="0">
-        <a:scrgbClr r="0" g="0" b="0"/>
-      </a:effectRef>
-      <a:fontRef idx="minor"/>
-    </dgm:style>
-  </dgm:styleLbl>
-  <dgm:styleLbl name="sibTrans2D1">
-    <dgm:scene3d>
-      <a:camera prst="orthographicFront"/>
-      <a:lightRig rig="threePt" dir="t"/>
-    </dgm:scene3d>
-    <dgm:sp3d/>
-    <dgm:txPr/>
-    <dgm:style>
-      <a:lnRef idx="0">
-        <a:scrgbClr r="0" g="0" b="0"/>
-      </a:lnRef>
-      <a:fillRef idx="1">
-        <a:scrgbClr r="0" g="0" b="0"/>
-      </a:fillRef>
-      <a:effectRef idx="0">
-        <a:scrgbClr r="0" g="0" b="0"/>
-      </a:effectRef>
-      <a:fontRef idx="minor">
-        <a:schemeClr val="lt1"/>
-      </a:fontRef>
-    </dgm:style>
-  </dgm:styleLbl>
-  <dgm:styleLbl name="fgSibTrans2D1">
-    <dgm:scene3d>
-      <a:camera prst="orthographicFront"/>
-      <a:lightRig rig="threePt" dir="t"/>
-    </dgm:scene3d>
-    <dgm:sp3d/>
-    <dgm:txPr/>
-    <dgm:style>
-      <a:lnRef idx="0">
-        <a:scrgbClr r="0" g="0" b="0"/>
-      </a:lnRef>
-      <a:fillRef idx="1">
-        <a:scrgbClr r="0" g="0" b="0"/>
-      </a:fillRef>
-      <a:effectRef idx="0">
-        <a:scrgbClr r="0" g="0" b="0"/>
-      </a:effectRef>
-      <a:fontRef idx="minor">
-        <a:schemeClr val="lt1"/>
-      </a:fontRef>
-    </dgm:style>
-  </dgm:styleLbl>
-  <dgm:styleLbl name="bgSibTrans2D1">
-    <dgm:scene3d>
-      <a:camera prst="orthographicFront"/>
-      <a:lightRig rig="threePt" dir="t"/>
-    </dgm:scene3d>
-    <dgm:sp3d/>
-    <dgm:txPr/>
-    <dgm:style>
-      <a:lnRef idx="0">
-        <a:scrgbClr r="0" g="0" b="0"/>
-      </a:lnRef>
-      <a:fillRef idx="1">
-        <a:scrgbClr r="0" g="0" b="0"/>
-      </a:fillRef>
-      <a:effectRef idx="0">
-        <a:scrgbClr r="0" g="0" b="0"/>
-      </a:effectRef>
-      <a:fontRef idx="minor">
-        <a:schemeClr val="lt1"/>
-      </a:fontRef>
-    </dgm:style>
-  </dgm:styleLbl>
-  <dgm:styleLbl name="sibTrans1D1">
-    <dgm:scene3d>
-      <a:camera prst="orthographicFront"/>
-      <a:lightRig rig="threePt" dir="t"/>
-    </dgm:scene3d>
-    <dgm:sp3d/>
-    <dgm:txPr/>
-    <dgm:style>
-      <a:lnRef idx="1">
-        <a:scrgbClr r="0" g="0" b="0"/>
-      </a:lnRef>
-      <a:fillRef idx="0">
-        <a:scrgbClr r="0" g="0" b="0"/>
-      </a:fillRef>
-      <a:effectRef idx="0">
-        <a:scrgbClr r="0" g="0" b="0"/>
-      </a:effectRef>
-      <a:fontRef idx="minor"/>
-    </dgm:style>
-  </dgm:styleLbl>
-  <dgm:styleLbl name="callout">
-    <dgm:scene3d>
-      <a:camera prst="orthographicFront"/>
-      <a:lightRig rig="threePt" dir="t"/>
-    </dgm:scene3d>
-    <dgm:sp3d/>
-    <dgm:txPr/>
-    <dgm:style>
-      <a:lnRef idx="2">
-        <a:scrgbClr r="0" g="0" b="0"/>
-      </a:lnRef>
-      <a:fillRef idx="1">
-        <a:scrgbClr r="0" g="0" b="0"/>
-      </a:fillRef>
-      <a:effectRef idx="0">
-        <a:scrgbClr r="0" g="0" b="0"/>
-      </a:effectRef>
-      <a:fontRef idx="minor"/>
-    </dgm:style>
-  </dgm:styleLbl>
-  <dgm:styleLbl name="asst0">
-    <dgm:scene3d>
-      <a:camera prst="orthographicFront"/>
-      <a:lightRig rig="threePt" dir="t"/>
-    </dgm:scene3d>
-    <dgm:sp3d/>
-    <dgm:txPr/>
-    <dgm:style>
-      <a:lnRef idx="2">
-        <a:scrgbClr r="0" g="0" b="0"/>
-      </a:lnRef>
-      <a:fillRef idx="1">
-        <a:scrgbClr r="0" g="0" b="0"/>
-      </a:fillRef>
-      <a:effectRef idx="0">
-        <a:scrgbClr r="0" g="0" b="0"/>
-      </a:effectRef>
-      <a:fontRef idx="minor">
-        <a:schemeClr val="lt1"/>
-      </a:fontRef>
-    </dgm:style>
-  </dgm:styleLbl>
-  <dgm:styleLbl name="asst1">
-    <dgm:scene3d>
-      <a:camera prst="orthographicFront"/>
-      <a:lightRig rig="threePt" dir="t"/>
-    </dgm:scene3d>
-    <dgm:sp3d/>
-    <dgm:txPr/>
-    <dgm:style>
-      <a:lnRef idx="2">
-        <a:scrgbClr r="0" g="0" b="0"/>
-      </a:lnRef>
-      <a:fillRef idx="1">
-        <a:scrgbClr r="0" g="0" b="0"/>
-      </a:fillRef>
-      <a:effectRef idx="0">
-        <a:scrgbClr r="0" g="0" b="0"/>
-      </a:effectRef>
-      <a:fontRef idx="minor">
-        <a:schemeClr val="lt1"/>
-      </a:fontRef>
-    </dgm:style>
-  </dgm:styleLbl>
-  <dgm:styleLbl name="asst2">
-    <dgm:scene3d>
-      <a:camera prst="orthographicFront"/>
-      <a:lightRig rig="threePt" dir="t"/>
-    </dgm:scene3d>
-    <dgm:sp3d/>
-    <dgm:txPr/>
-    <dgm:style>
-      <a:lnRef idx="2">
-        <a:scrgbClr r="0" g="0" b="0"/>
-      </a:lnRef>
-      <a:fillRef idx="1">
-        <a:scrgbClr r="0" g="0" b="0"/>
-      </a:fillRef>
-      <a:effectRef idx="0">
-        <a:scrgbClr r="0" g="0" b="0"/>
-      </a:effectRef>
-      <a:fontRef idx="minor">
-        <a:schemeClr val="lt1"/>
-      </a:fontRef>
-    </dgm:style>
-  </dgm:styleLbl>
-  <dgm:styleLbl name="asst3">
-    <dgm:scene3d>
-      <a:camera prst="orthographicFront"/>
-      <a:lightRig rig="threePt" dir="t"/>
-    </dgm:scene3d>
-    <dgm:sp3d/>
-    <dgm:txPr/>
-    <dgm:style>
-      <a:lnRef idx="2">
-        <a:scrgbClr r="0" g="0" b="0"/>
-      </a:lnRef>
-      <a:fillRef idx="1">
-        <a:scrgbClr r="0" g="0" b="0"/>
-      </a:fillRef>
-      <a:effectRef idx="0">
-        <a:scrgbClr r="0" g="0" b="0"/>
-      </a:effectRef>
-      <a:fontRef idx="minor">
-        <a:schemeClr val="lt1"/>
-      </a:fontRef>
-    </dgm:style>
-  </dgm:styleLbl>
-  <dgm:styleLbl name="asst4">
-    <dgm:scene3d>
-      <a:camera prst="orthographicFront"/>
-      <a:lightRig rig="threePt" dir="t"/>
-    </dgm:scene3d>
-    <dgm:sp3d/>
-    <dgm:txPr/>
-    <dgm:style>
-      <a:lnRef idx="2">
-        <a:scrgbClr r="0" g="0" b="0"/>
-      </a:lnRef>
-      <a:fillRef idx="1">
-        <a:scrgbClr r="0" g="0" b="0"/>
-      </a:fillRef>
-      <a:effectRef idx="0">
-        <a:scrgbClr r="0" g="0" b="0"/>
-      </a:effectRef>
-      <a:fontRef idx="minor">
-        <a:schemeClr val="lt1"/>
-      </a:fontRef>
-    </dgm:style>
-  </dgm:styleLbl>
-  <dgm:styleLbl name="parChTrans2D1">
-    <dgm:scene3d>
-      <a:camera prst="orthographicFront"/>
-      <a:lightRig rig="threePt" dir="t"/>
-    </dgm:scene3d>
-    <dgm:sp3d/>
-    <dgm:txPr/>
-    <dgm:style>
-      <a:lnRef idx="2">
-        <a:scrgbClr r="0" g="0" b="0"/>
-      </a:lnRef>
-      <a:fillRef idx="1">
-        <a:scrgbClr r="0" g="0" b="0"/>
-      </a:fillRef>
-      <a:effectRef idx="0">
-        <a:scrgbClr r="0" g="0" b="0"/>
-      </a:effectRef>
-      <a:fontRef idx="minor">
-        <a:schemeClr val="lt1"/>
-      </a:fontRef>
-    </dgm:style>
-  </dgm:styleLbl>
-  <dgm:styleLbl name="parChTrans2D2">
-    <dgm:scene3d>
-      <a:camera prst="orthographicFront"/>
-      <a:lightRig rig="threePt" dir="t"/>
-    </dgm:scene3d>
-    <dgm:sp3d/>
-    <dgm:txPr/>
-    <dgm:style>
-      <a:lnRef idx="2">
-        <a:scrgbClr r="0" g="0" b="0"/>
-      </a:lnRef>
-      <a:fillRef idx="1">
-        <a:scrgbClr r="0" g="0" b="0"/>
-      </a:fillRef>
-      <a:effectRef idx="0">
-        <a:scrgbClr r="0" g="0" b="0"/>
-      </a:effectRef>
-      <a:fontRef idx="minor">
-        <a:schemeClr val="lt1"/>
-      </a:fontRef>
-    </dgm:style>
-  </dgm:styleLbl>
-  <dgm:styleLbl name="parChTrans2D3">
-    <dgm:scene3d>
-      <a:camera prst="orthographicFront"/>
-      <a:lightRig rig="threePt" dir="t"/>
-    </dgm:scene3d>
-    <dgm:sp3d/>
-    <dgm:txPr/>
-    <dgm:style>
-      <a:lnRef idx="2">
-        <a:scrgbClr r="0" g="0" b="0"/>
-      </a:lnRef>
-      <a:fillRef idx="1">
-        <a:scrgbClr r="0" g="0" b="0"/>
-      </a:fillRef>
-      <a:effectRef idx="0">
-        <a:scrgbClr r="0" g="0" b="0"/>
-      </a:effectRef>
-      <a:fontRef idx="minor">
-        <a:schemeClr val="lt1"/>
-      </a:fontRef>
-    </dgm:style>
-  </dgm:styleLbl>
-  <dgm:styleLbl name="parChTrans2D4">
-    <dgm:scene3d>
-      <a:camera prst="orthographicFront"/>
-      <a:lightRig rig="threePt" dir="t"/>
-    </dgm:scene3d>
-    <dgm:sp3d/>
-    <dgm:txPr/>
-    <dgm:style>
-      <a:lnRef idx="2">
-        <a:scrgbClr r="0" g="0" b="0"/>
-      </a:lnRef>
-      <a:fillRef idx="1">
-        <a:scrgbClr r="0" g="0" b="0"/>
-      </a:fillRef>
-      <a:effectRef idx="0">
-        <a:scrgbClr r="0" g="0" b="0"/>
-      </a:effectRef>
-      <a:fontRef idx="minor">
-        <a:schemeClr val="lt1"/>
-      </a:fontRef>
-    </dgm:style>
-  </dgm:styleLbl>
-  <dgm:styleLbl name="parChTrans1D1">
-    <dgm:scene3d>
-      <a:camera prst="orthographicFront"/>
-      <a:lightRig rig="threePt" dir="t"/>
-    </dgm:scene3d>
-    <dgm:sp3d/>
-    <dgm:txPr/>
-    <dgm:style>
-      <a:lnRef idx="2">
-        <a:scrgbClr r="0" g="0" b="0"/>
-      </a:lnRef>
-      <a:fillRef idx="0">
-        <a:scrgbClr r="0" g="0" b="0"/>
-      </a:fillRef>
-      <a:effectRef idx="0">
-        <a:scrgbClr r="0" g="0" b="0"/>
-      </a:effectRef>
-      <a:fontRef idx="minor"/>
-    </dgm:style>
-  </dgm:styleLbl>
-  <dgm:styleLbl name="parChTrans1D2">
-    <dgm:scene3d>
-      <a:camera prst="orthographicFront"/>
-      <a:lightRig rig="threePt" dir="t"/>
-    </dgm:scene3d>
-    <dgm:sp3d/>
-    <dgm:txPr/>
-    <dgm:style>
-      <a:lnRef idx="2">
-        <a:scrgbClr r="0" g="0" b="0"/>
-      </a:lnRef>
-      <a:fillRef idx="0">
-        <a:scrgbClr r="0" g="0" b="0"/>
-      </a:fillRef>
-      <a:effectRef idx="0">
-        <a:scrgbClr r="0" g="0" b="0"/>
-      </a:effectRef>
-      <a:fontRef idx="minor"/>
-    </dgm:style>
-  </dgm:styleLbl>
-  <dgm:styleLbl name="parChTrans1D3">
-    <dgm:scene3d>
-      <a:camera prst="orthographicFront"/>
-      <a:lightRig rig="threePt" dir="t"/>
-    </dgm:scene3d>
-    <dgm:sp3d/>
-    <dgm:txPr/>
-    <dgm:style>
-      <a:lnRef idx="2">
-        <a:scrgbClr r="0" g="0" b="0"/>
-      </a:lnRef>
-      <a:fillRef idx="0">
-        <a:scrgbClr r="0" g="0" b="0"/>
-      </a:fillRef>
-      <a:effectRef idx="0">
-        <a:scrgbClr r="0" g="0" b="0"/>
-      </a:effectRef>
-      <a:fontRef idx="minor"/>
-    </dgm:style>
-  </dgm:styleLbl>
-  <dgm:styleLbl name="parChTrans1D4">
-    <dgm:scene3d>
-      <a:camera prst="orthographicFront"/>
-      <a:lightRig rig="threePt" dir="t"/>
-    </dgm:scene3d>
-    <dgm:sp3d/>
-    <dgm:txPr/>
-    <dgm:style>
-      <a:lnRef idx="2">
-        <a:scrgbClr r="0" g="0" b="0"/>
-      </a:lnRef>
-      <a:fillRef idx="0">
-        <a:scrgbClr r="0" g="0" b="0"/>
-      </a:fillRef>
-      <a:effectRef idx="0">
-        <a:scrgbClr r="0" g="0" b="0"/>
-      </a:effectRef>
-      <a:fontRef idx="minor"/>
-    </dgm:style>
-  </dgm:styleLbl>
-  <dgm:styleLbl name="fgAcc1">
-    <dgm:scene3d>
-      <a:camera prst="orthographicFront"/>
-      <a:lightRig rig="threePt" dir="t"/>
-    </dgm:scene3d>
-    <dgm:sp3d/>
-    <dgm:txPr/>
-    <dgm:style>
-      <a:lnRef idx="2">
-        <a:scrgbClr r="0" g="0" b="0"/>
-      </a:lnRef>
-      <a:fillRef idx="1">
-        <a:scrgbClr r="0" g="0" b="0"/>
-      </a:fillRef>
-      <a:effectRef idx="0">
-        <a:scrgbClr r="0" g="0" b="0"/>
-      </a:effectRef>
-      <a:fontRef idx="minor"/>
-    </dgm:style>
-  </dgm:styleLbl>
-  <dgm:styleLbl name="conFgAcc1">
-    <dgm:scene3d>
-      <a:camera prst="orthographicFront"/>
-      <a:lightRig rig="threePt" dir="t"/>
-    </dgm:scene3d>
-    <dgm:sp3d/>
-    <dgm:txPr/>
-    <dgm:style>
-      <a:lnRef idx="2">
-        <a:scrgbClr r="0" g="0" b="0"/>
-      </a:lnRef>
-      <a:fillRef idx="1">
-        <a:scrgbClr r="0" g="0" b="0"/>
-      </a:fillRef>
-      <a:effectRef idx="0">
-        <a:scrgbClr r="0" g="0" b="0"/>
-      </a:effectRef>
-      <a:fontRef idx="minor"/>
-    </dgm:style>
-  </dgm:styleLbl>
-  <dgm:styleLbl name="alignAcc1">
-    <dgm:scene3d>
-      <a:camera prst="orthographicFront"/>
-      <a:lightRig rig="threePt" dir="t"/>
-    </dgm:scene3d>
-    <dgm:sp3d/>
-    <dgm:txPr/>
-    <dgm:style>
-      <a:lnRef idx="2">
-        <a:scrgbClr r="0" g="0" b="0"/>
-      </a:lnRef>
-      <a:fillRef idx="1">
-        <a:scrgbClr r="0" g="0" b="0"/>
-      </a:fillRef>
-      <a:effectRef idx="0">
-        <a:scrgbClr r="0" g="0" b="0"/>
-      </a:effectRef>
-      <a:fontRef idx="minor"/>
-    </dgm:style>
-  </dgm:styleLbl>
-  <dgm:styleLbl name="trAlignAcc1">
-    <dgm:scene3d>
-      <a:camera prst="orthographicFront"/>
-      <a:lightRig rig="threePt" dir="t"/>
-    </dgm:scene3d>
-    <dgm:sp3d/>
-    <dgm:txPr/>
-    <dgm:style>
-      <a:lnRef idx="1">
-        <a:scrgbClr r="0" g="0" b="0"/>
-      </a:lnRef>
-      <a:fillRef idx="1">
-        <a:scrgbClr r="0" g="0" b="0"/>
-      </a:fillRef>
-      <a:effectRef idx="0">
-        <a:scrgbClr r="0" g="0" b="0"/>
-      </a:effectRef>
-      <a:fontRef idx="minor"/>
-    </dgm:style>
-  </dgm:styleLbl>
-  <dgm:styleLbl name="bgAcc1">
-    <dgm:scene3d>
-      <a:camera prst="orthographicFront"/>
-      <a:lightRig rig="threePt" dir="t"/>
-    </dgm:scene3d>
-    <dgm:sp3d/>
-    <dgm:txPr/>
-    <dgm:style>
-      <a:lnRef idx="2">
-        <a:scrgbClr r="0" g="0" b="0"/>
-      </a:lnRef>
-      <a:fillRef idx="1">
-        <a:scrgbClr r="0" g="0" b="0"/>
-      </a:fillRef>
-      <a:effectRef idx="0">
-        <a:scrgbClr r="0" g="0" b="0"/>
-      </a:effectRef>
-      <a:fontRef idx="minor"/>
-    </dgm:style>
-  </dgm:styleLbl>
-  <dgm:styleLbl name="solidFgAcc1">
-    <dgm:scene3d>
-      <a:camera prst="orthographicFront"/>
-      <a:lightRig rig="threePt" dir="t"/>
-    </dgm:scene3d>
-    <dgm:sp3d/>
-    <dgm:txPr/>
-    <dgm:style>
-      <a:lnRef idx="2">
-        <a:scrgbClr r="0" g="0" b="0"/>
-      </a:lnRef>
-      <a:fillRef idx="1">
-        <a:scrgbClr r="0" g="0" b="0"/>
-      </a:fillRef>
-      <a:effectRef idx="0">
-        <a:scrgbClr r="0" g="0" b="0"/>
-      </a:effectRef>
-      <a:fontRef idx="minor"/>
-    </dgm:style>
-  </dgm:styleLbl>
-  <dgm:styleLbl name="solidAlignAcc1">
-    <dgm:scene3d>
-      <a:camera prst="orthographicFront"/>
-      <a:lightRig rig="threePt" dir="t"/>
-    </dgm:scene3d>
-    <dgm:sp3d/>
-    <dgm:txPr/>
-    <dgm:style>
-      <a:lnRef idx="2">
-        <a:scrgbClr r="0" g="0" b="0"/>
-      </a:lnRef>
-      <a:fillRef idx="1">
-        <a:scrgbClr r="0" g="0" b="0"/>
-      </a:fillRef>
-      <a:effectRef idx="0">
-        <a:scrgbClr r="0" g="0" b="0"/>
-      </a:effectRef>
-      <a:fontRef idx="minor"/>
-    </dgm:style>
-  </dgm:styleLbl>
-  <dgm:styleLbl name="solidBgAcc1">
-    <dgm:scene3d>
-      <a:camera prst="orthographicFront"/>
-      <a:lightRig rig="threePt" dir="t"/>
-    </dgm:scene3d>
-    <dgm:sp3d/>
-    <dgm:txPr/>
-    <dgm:style>
-      <a:lnRef idx="2">
-        <a:scrgbClr r="0" g="0" b="0"/>
-      </a:lnRef>
-      <a:fillRef idx="1">
-        <a:scrgbClr r="0" g="0" b="0"/>
-      </a:fillRef>
-      <a:effectRef idx="0">
-        <a:scrgbClr r="0" g="0" b="0"/>
-      </a:effectRef>
-      <a:fontRef idx="minor"/>
-    </dgm:style>
-  </dgm:styleLbl>
-  <dgm:styleLbl name="fgAccFollowNode1">
-    <dgm:scene3d>
-      <a:camera prst="orthographicFront"/>
-      <a:lightRig rig="threePt" dir="t"/>
-    </dgm:scene3d>
-    <dgm:sp3d/>
-    <dgm:txPr/>
-    <dgm:style>
-      <a:lnRef idx="2">
-        <a:scrgbClr r="0" g="0" b="0"/>
-      </a:lnRef>
-      <a:fillRef idx="1">
-        <a:scrgbClr r="0" g="0" b="0"/>
-      </a:fillRef>
-      <a:effectRef idx="0">
-        <a:scrgbClr r="0" g="0" b="0"/>
-      </a:effectRef>
-      <a:fontRef idx="minor"/>
-    </dgm:style>
-  </dgm:styleLbl>
-  <dgm:styleLbl name="alignAccFollowNode1">
-    <dgm:scene3d>
-      <a:camera prst="orthographicFront"/>
-      <a:lightRig rig="threePt" dir="t"/>
-    </dgm:scene3d>
-    <dgm:sp3d/>
-    <dgm:txPr/>
-    <dgm:style>
-      <a:lnRef idx="2">
-        <a:scrgbClr r="0" g="0" b="0"/>
-      </a:lnRef>
-      <a:fillRef idx="1">
-        <a:scrgbClr r="0" g="0" b="0"/>
-      </a:fillRef>
-      <a:effectRef idx="0">
-        <a:scrgbClr r="0" g="0" b="0"/>
-      </a:effectRef>
-      <a:fontRef idx="minor"/>
-    </dgm:style>
-  </dgm:styleLbl>
-  <dgm:styleLbl name="bgAccFollowNode1">
-    <dgm:scene3d>
-      <a:camera prst="orthographicFront"/>
-      <a:lightRig rig="threePt" dir="t"/>
-    </dgm:scene3d>
-    <dgm:sp3d/>
-    <dgm:txPr/>
-    <dgm:style>
-      <a:lnRef idx="2">
-        <a:scrgbClr r="0" g="0" b="0"/>
-      </a:lnRef>
-      <a:fillRef idx="1">
-        <a:scrgbClr r="0" g="0" b="0"/>
-      </a:fillRef>
-      <a:effectRef idx="0">
-        <a:scrgbClr r="0" g="0" b="0"/>
-      </a:effectRef>
-      <a:fontRef idx="minor"/>
-    </dgm:style>
-  </dgm:styleLbl>
-  <dgm:styleLbl name="fgAcc0">
-    <dgm:scene3d>
-      <a:camera prst="orthographicFront"/>
-      <a:lightRig rig="threePt" dir="t"/>
-    </dgm:scene3d>
-    <dgm:sp3d/>
-    <dgm:txPr/>
-    <dgm:style>
-      <a:lnRef idx="2">
-        <a:scrgbClr r="0" g="0" b="0"/>
-      </a:lnRef>
-      <a:fillRef idx="1">
-        <a:scrgbClr r="0" g="0" b="0"/>
-      </a:fillRef>
-      <a:effectRef idx="0">
-        <a:scrgbClr r="0" g="0" b="0"/>
-      </a:effectRef>
-      <a:fontRef idx="minor"/>
-    </dgm:style>
-  </dgm:styleLbl>
-  <dgm:styleLbl name="fgAcc2">
-    <dgm:scene3d>
-      <a:camera prst="orthographicFront"/>
-      <a:lightRig rig="threePt" dir="t"/>
-    </dgm:scene3d>
-    <dgm:sp3d/>
-    <dgm:txPr/>
-    <dgm:style>
-      <a:lnRef idx="2">
-        <a:scrgbClr r="0" g="0" b="0"/>
-      </a:lnRef>
-      <a:fillRef idx="1">
-        <a:scrgbClr r="0" g="0" b="0"/>
-      </a:fillRef>
-      <a:effectRef idx="0">
-        <a:scrgbClr r="0" g="0" b="0"/>
-      </a:effectRef>
-      <a:fontRef idx="minor"/>
-    </dgm:style>
-  </dgm:styleLbl>
-  <dgm:styleLbl name="fgAcc3">
-    <dgm:scene3d>
-      <a:camera prst="orthographicFront"/>
-      <a:lightRig rig="threePt" dir="t"/>
-    </dgm:scene3d>
-    <dgm:sp3d/>
-    <dgm:txPr/>
-    <dgm:style>
-      <a:lnRef idx="2">
-        <a:scrgbClr r="0" g="0" b="0"/>
-      </a:lnRef>
-      <a:fillRef idx="1">
-        <a:scrgbClr r="0" g="0" b="0"/>
-      </a:fillRef>
-      <a:effectRef idx="0">
-        <a:scrgbClr r="0" g="0" b="0"/>
-      </a:effectRef>
-      <a:fontRef idx="minor"/>
-    </dgm:style>
-  </dgm:styleLbl>
-  <dgm:styleLbl name="fgAcc4">
-    <dgm:scene3d>
-      <a:camera prst="orthographicFront"/>
-      <a:lightRig rig="threePt" dir="t"/>
-    </dgm:scene3d>
-    <dgm:sp3d/>
-    <dgm:txPr/>
-    <dgm:style>
-      <a:lnRef idx="2">
-        <a:scrgbClr r="0" g="0" b="0"/>
-      </a:lnRef>
-      <a:fillRef idx="1">
-        <a:scrgbClr r="0" g="0" b="0"/>
-      </a:fillRef>
-      <a:effectRef idx="0">
-        <a:scrgbClr r="0" g="0" b="0"/>
-      </a:effectRef>
-      <a:fontRef idx="minor"/>
-    </dgm:style>
-  </dgm:styleLbl>
-  <dgm:styleLbl name="bgShp">
-    <dgm:scene3d>
-      <a:camera prst="orthographicFront"/>
-      <a:lightRig rig="threePt" dir="t"/>
-    </dgm:scene3d>
-    <dgm:sp3d/>
-    <dgm:txPr/>
-    <dgm:style>
-      <a:lnRef idx="0">
-        <a:scrgbClr r="0" g="0" b="0"/>
-      </a:lnRef>
-      <a:fillRef idx="1">
-        <a:scrgbClr r="0" g="0" b="0"/>
-      </a:fillRef>
-      <a:effectRef idx="0">
-        <a:scrgbClr r="0" g="0" b="0"/>
-      </a:effectRef>
-      <a:fontRef idx="minor"/>
-    </dgm:style>
-  </dgm:styleLbl>
-  <dgm:styleLbl name="dkBgShp">
-    <dgm:scene3d>
-      <a:camera prst="orthographicFront"/>
-      <a:lightRig rig="threePt" dir="t"/>
-    </dgm:scene3d>
-    <dgm:sp3d/>
-    <dgm:txPr/>
-    <dgm:style>
-      <a:lnRef idx="0">
-        <a:scrgbClr r="0" g="0" b="0"/>
-      </a:lnRef>
-      <a:fillRef idx="1">
-        <a:scrgbClr r="0" g="0" b="0"/>
-      </a:fillRef>
-      <a:effectRef idx="0">
-        <a:scrgbClr r="0" g="0" b="0"/>
-      </a:effectRef>
-      <a:fontRef idx="minor"/>
-    </dgm:style>
-  </dgm:styleLbl>
-  <dgm:styleLbl name="trBgShp">
-    <dgm:scene3d>
-      <a:camera prst="orthographicFront"/>
-      <a:lightRig rig="threePt" dir="t"/>
-    </dgm:scene3d>
-    <dgm:sp3d/>
-    <dgm:txPr/>
-    <dgm:style>
-      <a:lnRef idx="0">
-        <a:scrgbClr r="0" g="0" b="0"/>
-      </a:lnRef>
-      <a:fillRef idx="1">
-        <a:scrgbClr r="0" g="0" b="0"/>
-      </a:fillRef>
-      <a:effectRef idx="0">
-        <a:scrgbClr r="0" g="0" b="0"/>
-      </a:effectRef>
-      <a:fontRef idx="minor"/>
-    </dgm:style>
-  </dgm:styleLbl>
-  <dgm:styleLbl name="fgShp">
-    <dgm:scene3d>
-      <a:camera prst="orthographicFront"/>
-      <a:lightRig rig="threePt" dir="t"/>
-    </dgm:scene3d>
-    <dgm:sp3d/>
-    <dgm:txPr/>
-    <dgm:style>
-      <a:lnRef idx="2">
-        <a:scrgbClr r="0" g="0" b="0"/>
-      </a:lnRef>
-      <a:fillRef idx="1">
-        <a:scrgbClr r="0" g="0" b="0"/>
-      </a:fillRef>
-      <a:effectRef idx="0">
-        <a:scrgbClr r="0" g="0" b="0"/>
-      </a:effectRef>
-      <a:fontRef idx="minor"/>
-    </dgm:style>
-  </dgm:styleLbl>
-  <dgm:styleLbl name="revTx">
-    <dgm:scene3d>
-      <a:camera prst="orthographicFront"/>
-      <a:lightRig rig="threePt" dir="t"/>
-    </dgm:scene3d>
-    <dgm:sp3d/>
-    <dgm:txPr/>
-    <dgm:style>
-      <a:lnRef idx="0">
-        <a:scrgbClr r="0" g="0" b="0"/>
-      </a:lnRef>
-      <a:fillRef idx="0">
-        <a:scrgbClr r="0" g="0" b="0"/>
-      </a:fillRef>
-      <a:effectRef idx="0">
-        <a:scrgbClr r="0" g="0" b="0"/>
-      </a:effectRef>
-      <a:fontRef idx="minor"/>
-    </dgm:style>
-  </dgm:styleLbl>
-</dgm:styleDef>
-</file>
-
 <file path=ppt/slideLayouts/slideLayout1.xml><?xml version="1.0" encoding="utf-8"?>
 <p:sldLayout xmlns:a="http://schemas.openxmlformats.org/drawingml/2006/main" xmlns:r="http://schemas.openxmlformats.org/officeDocument/2006/relationships" xmlns:p="http://schemas.openxmlformats.org/presentationml/2006/main" type="title" preserve="1">
   <p:cSld name="Diapositive de titre">
@@ -6196,7 +3388,7 @@
           <a:p>
             <a:fld id="{640C21D4-18E2-4FC5-B36F-99B346DF1253}" type="datetimeFigureOut">
               <a:rPr lang="fr-FR" smtClean="0"/>
-              <a:t>09/11/2015</a:t>
+              <a:t>10/11/2015</a:t>
             </a:fld>
             <a:endParaRPr lang="fr-FR"/>
           </a:p>
@@ -6366,7 +3558,7 @@
           <a:p>
             <a:fld id="{640C21D4-18E2-4FC5-B36F-99B346DF1253}" type="datetimeFigureOut">
               <a:rPr lang="fr-FR" smtClean="0"/>
-              <a:t>09/11/2015</a:t>
+              <a:t>10/11/2015</a:t>
             </a:fld>
             <a:endParaRPr lang="fr-FR"/>
           </a:p>
@@ -6546,7 +3738,7 @@
           <a:p>
             <a:fld id="{640C21D4-18E2-4FC5-B36F-99B346DF1253}" type="datetimeFigureOut">
               <a:rPr lang="fr-FR" smtClean="0"/>
-              <a:t>09/11/2015</a:t>
+              <a:t>10/11/2015</a:t>
             </a:fld>
             <a:endParaRPr lang="fr-FR"/>
           </a:p>
@@ -6716,7 +3908,7 @@
           <a:p>
             <a:fld id="{640C21D4-18E2-4FC5-B36F-99B346DF1253}" type="datetimeFigureOut">
               <a:rPr lang="fr-FR" smtClean="0"/>
-              <a:t>09/11/2015</a:t>
+              <a:t>10/11/2015</a:t>
             </a:fld>
             <a:endParaRPr lang="fr-FR"/>
           </a:p>
@@ -6962,7 +4154,7 @@
           <a:p>
             <a:fld id="{640C21D4-18E2-4FC5-B36F-99B346DF1253}" type="datetimeFigureOut">
               <a:rPr lang="fr-FR" smtClean="0"/>
-              <a:t>09/11/2015</a:t>
+              <a:t>10/11/2015</a:t>
             </a:fld>
             <a:endParaRPr lang="fr-FR"/>
           </a:p>
@@ -7194,7 +4386,7 @@
           <a:p>
             <a:fld id="{640C21D4-18E2-4FC5-B36F-99B346DF1253}" type="datetimeFigureOut">
               <a:rPr lang="fr-FR" smtClean="0"/>
-              <a:t>09/11/2015</a:t>
+              <a:t>10/11/2015</a:t>
             </a:fld>
             <a:endParaRPr lang="fr-FR"/>
           </a:p>
@@ -7561,7 +4753,7 @@
           <a:p>
             <a:fld id="{640C21D4-18E2-4FC5-B36F-99B346DF1253}" type="datetimeFigureOut">
               <a:rPr lang="fr-FR" smtClean="0"/>
-              <a:t>09/11/2015</a:t>
+              <a:t>10/11/2015</a:t>
             </a:fld>
             <a:endParaRPr lang="fr-FR"/>
           </a:p>
@@ -7679,7 +4871,7 @@
           <a:p>
             <a:fld id="{640C21D4-18E2-4FC5-B36F-99B346DF1253}" type="datetimeFigureOut">
               <a:rPr lang="fr-FR" smtClean="0"/>
-              <a:t>09/11/2015</a:t>
+              <a:t>10/11/2015</a:t>
             </a:fld>
             <a:endParaRPr lang="fr-FR"/>
           </a:p>
@@ -7774,7 +4966,7 @@
           <a:p>
             <a:fld id="{640C21D4-18E2-4FC5-B36F-99B346DF1253}" type="datetimeFigureOut">
               <a:rPr lang="fr-FR" smtClean="0"/>
-              <a:t>09/11/2015</a:t>
+              <a:t>10/11/2015</a:t>
             </a:fld>
             <a:endParaRPr lang="fr-FR"/>
           </a:p>
@@ -8051,7 +5243,7 @@
           <a:p>
             <a:fld id="{640C21D4-18E2-4FC5-B36F-99B346DF1253}" type="datetimeFigureOut">
               <a:rPr lang="fr-FR" smtClean="0"/>
-              <a:t>09/11/2015</a:t>
+              <a:t>10/11/2015</a:t>
             </a:fld>
             <a:endParaRPr lang="fr-FR"/>
           </a:p>
@@ -8304,7 +5496,7 @@
           <a:p>
             <a:fld id="{640C21D4-18E2-4FC5-B36F-99B346DF1253}" type="datetimeFigureOut">
               <a:rPr lang="fr-FR" smtClean="0"/>
-              <a:t>09/11/2015</a:t>
+              <a:t>10/11/2015</a:t>
             </a:fld>
             <a:endParaRPr lang="fr-FR"/>
           </a:p>
@@ -8517,7 +5709,7 @@
           <a:p>
             <a:fld id="{640C21D4-18E2-4FC5-B36F-99B346DF1253}" type="datetimeFigureOut">
               <a:rPr lang="fr-FR" smtClean="0"/>
-              <a:t>09/11/2015</a:t>
+              <a:t>10/11/2015</a:t>
             </a:fld>
             <a:endParaRPr lang="fr-FR"/>
           </a:p>
@@ -9467,7 +6659,7 @@
         </p:nvSpPr>
         <p:spPr>
           <a:xfrm>
-            <a:off x="2730321" y="1674448"/>
+            <a:off x="2971621" y="1674448"/>
             <a:ext cx="1609859" cy="4546048"/>
           </a:xfrm>
           <a:prstGeom prst="rect">
@@ -9514,7 +6706,7 @@
         </p:nvSpPr>
         <p:spPr>
           <a:xfrm>
-            <a:off x="4503312" y="1674448"/>
+            <a:off x="4744612" y="1674448"/>
             <a:ext cx="1609859" cy="4546048"/>
           </a:xfrm>
           <a:prstGeom prst="rect">
@@ -9561,7 +6753,7 @@
         </p:nvSpPr>
         <p:spPr>
           <a:xfrm>
-            <a:off x="6293328" y="1680953"/>
+            <a:off x="6534628" y="1680953"/>
             <a:ext cx="1609859" cy="4539543"/>
           </a:xfrm>
           <a:prstGeom prst="rect">
@@ -9623,7 +6815,7 @@
         </p:blipFill>
         <p:spPr bwMode="auto">
           <a:xfrm>
-            <a:off x="3074426" y="4959200"/>
+            <a:off x="3315726" y="4959200"/>
             <a:ext cx="921647" cy="643233"/>
           </a:xfrm>
           <a:prstGeom prst="rect">
@@ -9664,7 +6856,7 @@
         </p:blipFill>
         <p:spPr bwMode="auto">
           <a:xfrm>
-            <a:off x="4799382" y="4962254"/>
+            <a:off x="5040682" y="4962254"/>
             <a:ext cx="825722" cy="679223"/>
           </a:xfrm>
           <a:prstGeom prst="rect">
@@ -9705,7 +6897,7 @@
         </p:blipFill>
         <p:spPr bwMode="auto">
           <a:xfrm>
-            <a:off x="6725363" y="4965222"/>
+            <a:off x="6966663" y="4965222"/>
             <a:ext cx="637211" cy="637211"/>
           </a:xfrm>
           <a:prstGeom prst="rect">
@@ -9731,7 +6923,7 @@
         </p:nvSpPr>
         <p:spPr>
           <a:xfrm>
-            <a:off x="2996736" y="5641477"/>
+            <a:off x="3238036" y="5641477"/>
             <a:ext cx="1077026" cy="369332"/>
           </a:xfrm>
           <a:prstGeom prst="rect">
@@ -9761,7 +6953,7 @@
         </p:nvSpPr>
         <p:spPr>
           <a:xfrm>
-            <a:off x="5006065" y="5602433"/>
+            <a:off x="5247365" y="5602433"/>
             <a:ext cx="607602" cy="369332"/>
           </a:xfrm>
           <a:prstGeom prst="rect">
@@ -9791,7 +6983,7 @@
         </p:nvSpPr>
         <p:spPr>
           <a:xfrm>
-            <a:off x="6547721" y="5641477"/>
+            <a:off x="6789021" y="5641477"/>
             <a:ext cx="1101071" cy="369332"/>
           </a:xfrm>
           <a:prstGeom prst="rect">
@@ -9821,7 +7013,7 @@
         </p:nvSpPr>
         <p:spPr>
           <a:xfrm>
-            <a:off x="2982213" y="1272577"/>
+            <a:off x="3223513" y="1272577"/>
             <a:ext cx="1117614" cy="369332"/>
           </a:xfrm>
           <a:prstGeom prst="rect">
@@ -9863,7 +7055,7 @@
         </p:nvSpPr>
         <p:spPr>
           <a:xfrm>
-            <a:off x="4653436" y="1269098"/>
+            <a:off x="4894736" y="1269098"/>
             <a:ext cx="1098378" cy="369332"/>
           </a:xfrm>
           <a:prstGeom prst="rect">
@@ -9915,7 +7107,7 @@
         </p:nvSpPr>
         <p:spPr>
           <a:xfrm>
-            <a:off x="6485161" y="1233375"/>
+            <a:off x="6726461" y="1233375"/>
             <a:ext cx="1026243" cy="369332"/>
           </a:xfrm>
           <a:prstGeom prst="rect">
@@ -9972,6 +7164,16 @@
 <file path=ppt/slides/slide3.xml><?xml version="1.0" encoding="utf-8"?>
 <p:sld xmlns:a="http://schemas.openxmlformats.org/drawingml/2006/main" xmlns:r="http://schemas.openxmlformats.org/officeDocument/2006/relationships" xmlns:p="http://schemas.openxmlformats.org/presentationml/2006/main">
   <p:cSld>
+    <p:bg>
+      <p:bgPr>
+        <a:solidFill>
+          <a:schemeClr val="bg2">
+            <a:lumMod val="25000"/>
+          </a:schemeClr>
+        </a:solidFill>
+        <a:effectLst/>
+      </p:bgPr>
+    </p:bg>
     <p:spTree>
       <p:nvGrpSpPr>
         <p:cNvPr id="1" name=""/>
@@ -10094,131 +7296,6 @@
                 </a:solidFill>
               </a:rPr>
               <a:t>app</a:t>
-            </a:r>
-            <a:endParaRPr lang="fr-FR" sz="2000" b="1" dirty="0">
-              <a:solidFill>
-                <a:schemeClr val="bg1"/>
-              </a:solidFill>
-            </a:endParaRPr>
-          </a:p>
-        </p:txBody>
-      </p:sp>
-      <p:graphicFrame>
-        <p:nvGraphicFramePr>
-          <p:cNvPr id="5" name="Diagramme 4"/>
-          <p:cNvGraphicFramePr/>
-          <p:nvPr>
-            <p:extLst>
-              <p:ext uri="{D42A27DB-BD31-4B8C-83A1-F6EECF244321}">
-                <p14:modId xmlns:p14="http://schemas.microsoft.com/office/powerpoint/2010/main" val="1732096729"/>
-              </p:ext>
-            </p:extLst>
-          </p:nvPr>
-        </p:nvGraphicFramePr>
-        <p:xfrm>
-          <a:off x="5270036" y="778659"/>
-          <a:ext cx="7469946" cy="4979964"/>
-        </p:xfrm>
-        <a:graphic>
-          <a:graphicData uri="http://schemas.openxmlformats.org/drawingml/2006/diagram">
-            <dgm:relIds xmlns:dgm="http://schemas.openxmlformats.org/drawingml/2006/diagram" xmlns:r="http://schemas.openxmlformats.org/officeDocument/2006/relationships" r:dm="rId7" r:lo="rId8" r:qs="rId9" r:cs="rId10"/>
-          </a:graphicData>
-        </a:graphic>
-      </p:graphicFrame>
-      <p:sp>
-        <p:nvSpPr>
-          <p:cNvPr id="9" name="Rectangle 8"/>
-          <p:cNvSpPr/>
-          <p:nvPr/>
-        </p:nvSpPr>
-        <p:spPr>
-          <a:xfrm>
-            <a:off x="6367976" y="453185"/>
-            <a:ext cx="5277779" cy="6108208"/>
-          </a:xfrm>
-          <a:prstGeom prst="rect">
-            <a:avLst/>
-          </a:prstGeom>
-          <a:noFill/>
-          <a:ln w="28575">
-            <a:solidFill>
-              <a:schemeClr val="bg1">
-                <a:lumMod val="75000"/>
-              </a:schemeClr>
-            </a:solidFill>
-            <a:prstDash val="dash"/>
-          </a:ln>
-        </p:spPr>
-        <p:style>
-          <a:lnRef idx="2">
-            <a:schemeClr val="accent1">
-              <a:shade val="50000"/>
-            </a:schemeClr>
-          </a:lnRef>
-          <a:fillRef idx="1">
-            <a:schemeClr val="accent1"/>
-          </a:fillRef>
-          <a:effectRef idx="0">
-            <a:schemeClr val="accent1"/>
-          </a:effectRef>
-          <a:fontRef idx="minor">
-            <a:schemeClr val="lt1"/>
-          </a:fontRef>
-        </p:style>
-        <p:txBody>
-          <a:bodyPr rtlCol="0" anchor="ctr"/>
-          <a:lstStyle/>
-          <a:p>
-            <a:pPr algn="ctr"/>
-            <a:endParaRPr lang="fr-FR" dirty="0"/>
-          </a:p>
-        </p:txBody>
-      </p:sp>
-      <p:sp>
-        <p:nvSpPr>
-          <p:cNvPr id="10" name="ZoneTexte 9"/>
-          <p:cNvSpPr txBox="1"/>
-          <p:nvPr/>
-        </p:nvSpPr>
-        <p:spPr>
-          <a:xfrm>
-            <a:off x="6367976" y="453185"/>
-            <a:ext cx="1992253" cy="400110"/>
-          </a:xfrm>
-          <a:prstGeom prst="rect">
-            <a:avLst/>
-          </a:prstGeom>
-          <a:noFill/>
-        </p:spPr>
-        <p:txBody>
-          <a:bodyPr wrap="square" rtlCol="0">
-            <a:spAutoFit/>
-          </a:bodyPr>
-          <a:lstStyle/>
-          <a:p>
-            <a:r>
-              <a:rPr lang="fr-FR" sz="2000" b="1" dirty="0" smtClean="0">
-                <a:solidFill>
-                  <a:schemeClr val="bg1"/>
-                </a:solidFill>
-              </a:rPr>
-              <a:t>Symfony2  </a:t>
-            </a:r>
-            <a:r>
-              <a:rPr lang="fr-FR" sz="2000" b="1" dirty="0" err="1" smtClean="0">
-                <a:solidFill>
-                  <a:schemeClr val="bg1"/>
-                </a:solidFill>
-              </a:rPr>
-              <a:t>app</a:t>
-            </a:r>
-            <a:r>
-              <a:rPr lang="fr-FR" sz="2000" b="1" dirty="0" smtClean="0">
-                <a:solidFill>
-                  <a:schemeClr val="bg1"/>
-                </a:solidFill>
-              </a:rPr>
-              <a:t> 2</a:t>
             </a:r>
             <a:endParaRPr lang="fr-FR" sz="2000" b="1" dirty="0">
               <a:solidFill>

</xml_diff>

<commit_message>
Update Symfony2 training + schéma (pourquoi-symfony-silex)
</commit_message>
<xml_diff>
--- a/slides/pourquoi-symfony-silex/img/schemas.pptx
+++ b/slides/pourquoi-symfony-silex/img/schemas.pptx
@@ -1282,588 +1282,6 @@
       <dsp:cNvGrpSpPr/>
     </dsp:nvGrpSpPr>
     <dsp:grpSpPr/>
-    <dsp:sp modelId="{0352F6E0-02FC-477B-8086-E10CEF382E13}">
-      <dsp:nvSpPr>
-        <dsp:cNvPr id="0" name=""/>
-        <dsp:cNvSpPr/>
-      </dsp:nvSpPr>
-      <dsp:spPr>
-        <a:xfrm rot="5400000">
-          <a:off x="3506806" y="130656"/>
-          <a:ext cx="2008628" cy="1747506"/>
-        </a:xfrm>
-        <a:prstGeom prst="hexagon">
-          <a:avLst>
-            <a:gd name="adj" fmla="val 25000"/>
-            <a:gd name="vf" fmla="val 115470"/>
-          </a:avLst>
-        </a:prstGeom>
-        <a:solidFill>
-          <a:schemeClr val="accent3">
-            <a:hueOff val="0"/>
-            <a:satOff val="0"/>
-            <a:lumOff val="0"/>
-            <a:alphaOff val="0"/>
-          </a:schemeClr>
-        </a:solidFill>
-        <a:ln w="12700" cap="flat" cmpd="sng" algn="ctr">
-          <a:solidFill>
-            <a:schemeClr val="lt1">
-              <a:hueOff val="0"/>
-              <a:satOff val="0"/>
-              <a:lumOff val="0"/>
-              <a:alphaOff val="0"/>
-            </a:schemeClr>
-          </a:solidFill>
-          <a:prstDash val="solid"/>
-          <a:miter lim="800000"/>
-        </a:ln>
-        <a:effectLst/>
-      </dsp:spPr>
-      <dsp:style>
-        <a:lnRef idx="2">
-          <a:scrgbClr r="0" g="0" b="0"/>
-        </a:lnRef>
-        <a:fillRef idx="1">
-          <a:scrgbClr r="0" g="0" b="0"/>
-        </a:fillRef>
-        <a:effectRef idx="0">
-          <a:scrgbClr r="0" g="0" b="0"/>
-        </a:effectRef>
-        <a:fontRef idx="minor">
-          <a:schemeClr val="lt1"/>
-        </a:fontRef>
-      </dsp:style>
-      <dsp:txBody>
-        <a:bodyPr spcFirstLastPara="0" vert="horz" wrap="square" lIns="125730" tIns="125730" rIns="125730" bIns="125730" numCol="1" spcCol="1270" anchor="ctr" anchorCtr="0">
-          <a:noAutofit/>
-        </a:bodyPr>
-        <a:lstStyle/>
-        <a:p>
-          <a:pPr lvl="0" algn="ctr" defTabSz="1466850">
-            <a:lnSpc>
-              <a:spcPct val="90000"/>
-            </a:lnSpc>
-            <a:spcBef>
-              <a:spcPct val="0"/>
-            </a:spcBef>
-            <a:spcAft>
-              <a:spcPct val="35000"/>
-            </a:spcAft>
-          </a:pPr>
-          <a:r>
-            <a:rPr lang="fr-FR" sz="3300" kern="1200" dirty="0" smtClean="0"/>
-            <a:t>PDF</a:t>
-          </a:r>
-          <a:endParaRPr lang="fr-FR" sz="3300" kern="1200" dirty="0"/>
-        </a:p>
-      </dsp:txBody>
-      <dsp:txXfrm rot="-5400000">
-        <a:off x="3909687" y="313106"/>
-        <a:ext cx="1202866" cy="1382606"/>
-      </dsp:txXfrm>
-    </dsp:sp>
-    <dsp:sp modelId="{C4965D86-4AB0-457B-BE5E-95F56711F394}">
-      <dsp:nvSpPr>
-        <dsp:cNvPr id="0" name=""/>
-        <dsp:cNvSpPr/>
-      </dsp:nvSpPr>
-      <dsp:spPr>
-        <a:xfrm>
-          <a:off x="5437901" y="401821"/>
-          <a:ext cx="2241629" cy="1205177"/>
-        </a:xfrm>
-        <a:prstGeom prst="rect">
-          <a:avLst/>
-        </a:prstGeom>
-        <a:noFill/>
-        <a:ln>
-          <a:noFill/>
-        </a:ln>
-        <a:effectLst/>
-      </dsp:spPr>
-      <dsp:style>
-        <a:lnRef idx="0">
-          <a:scrgbClr r="0" g="0" b="0"/>
-        </a:lnRef>
-        <a:fillRef idx="0">
-          <a:scrgbClr r="0" g="0" b="0"/>
-        </a:fillRef>
-        <a:effectRef idx="0">
-          <a:scrgbClr r="0" g="0" b="0"/>
-        </a:effectRef>
-        <a:fontRef idx="minor"/>
-      </dsp:style>
-    </dsp:sp>
-    <dsp:sp modelId="{B1A846A2-0982-4161-AEFA-67EFAA158E08}">
-      <dsp:nvSpPr>
-        <dsp:cNvPr id="0" name=""/>
-        <dsp:cNvSpPr/>
-      </dsp:nvSpPr>
-      <dsp:spPr>
-        <a:xfrm rot="5400000">
-          <a:off x="1619499" y="130656"/>
-          <a:ext cx="2008628" cy="1747506"/>
-        </a:xfrm>
-        <a:prstGeom prst="hexagon">
-          <a:avLst>
-            <a:gd name="adj" fmla="val 25000"/>
-            <a:gd name="vf" fmla="val 115470"/>
-          </a:avLst>
-        </a:prstGeom>
-        <a:solidFill>
-          <a:schemeClr val="accent3">
-            <a:hueOff val="542120"/>
-            <a:satOff val="20000"/>
-            <a:lumOff val="-2941"/>
-            <a:alphaOff val="0"/>
-          </a:schemeClr>
-        </a:solidFill>
-        <a:ln w="12700" cap="flat" cmpd="sng" algn="ctr">
-          <a:solidFill>
-            <a:schemeClr val="lt1">
-              <a:hueOff val="0"/>
-              <a:satOff val="0"/>
-              <a:lumOff val="0"/>
-              <a:alphaOff val="0"/>
-            </a:schemeClr>
-          </a:solidFill>
-          <a:prstDash val="solid"/>
-          <a:miter lim="800000"/>
-        </a:ln>
-        <a:effectLst/>
-      </dsp:spPr>
-      <dsp:style>
-        <a:lnRef idx="2">
-          <a:scrgbClr r="0" g="0" b="0"/>
-        </a:lnRef>
-        <a:fillRef idx="1">
-          <a:scrgbClr r="0" g="0" b="0"/>
-        </a:fillRef>
-        <a:effectRef idx="0">
-          <a:scrgbClr r="0" g="0" b="0"/>
-        </a:effectRef>
-        <a:fontRef idx="minor">
-          <a:schemeClr val="lt1"/>
-        </a:fontRef>
-      </dsp:style>
-      <dsp:txBody>
-        <a:bodyPr spcFirstLastPara="0" vert="horz" wrap="square" lIns="0" tIns="0" rIns="0" bIns="0" numCol="1" spcCol="1270" anchor="ctr" anchorCtr="0">
-          <a:noAutofit/>
-        </a:bodyPr>
-        <a:lstStyle/>
-        <a:p>
-          <a:pPr lvl="0" algn="ctr" defTabSz="666750">
-            <a:lnSpc>
-              <a:spcPct val="90000"/>
-            </a:lnSpc>
-            <a:spcBef>
-              <a:spcPct val="0"/>
-            </a:spcBef>
-            <a:spcAft>
-              <a:spcPct val="35000"/>
-            </a:spcAft>
-          </a:pPr>
-          <a:r>
-            <a:rPr lang="fr-FR" sz="1500" kern="1200" dirty="0" smtClean="0"/>
-            <a:t>Documentation</a:t>
-          </a:r>
-          <a:endParaRPr lang="fr-FR" sz="1500" kern="1200" dirty="0"/>
-        </a:p>
-      </dsp:txBody>
-      <dsp:txXfrm rot="-5400000">
-        <a:off x="2022380" y="313106"/>
-        <a:ext cx="1202866" cy="1382606"/>
-      </dsp:txXfrm>
-    </dsp:sp>
-    <dsp:sp modelId="{BD2B66BF-80F9-487D-B50C-23661AB88AA6}">
-      <dsp:nvSpPr>
-        <dsp:cNvPr id="0" name=""/>
-        <dsp:cNvSpPr/>
-      </dsp:nvSpPr>
-      <dsp:spPr>
-        <a:xfrm rot="5400000">
-          <a:off x="2559537" y="1835580"/>
-          <a:ext cx="2008628" cy="1747506"/>
-        </a:xfrm>
-        <a:prstGeom prst="hexagon">
-          <a:avLst>
-            <a:gd name="adj" fmla="val 25000"/>
-            <a:gd name="vf" fmla="val 115470"/>
-          </a:avLst>
-        </a:prstGeom>
-        <a:solidFill>
-          <a:schemeClr val="accent3">
-            <a:hueOff val="1084240"/>
-            <a:satOff val="40000"/>
-            <a:lumOff val="-5882"/>
-            <a:alphaOff val="0"/>
-          </a:schemeClr>
-        </a:solidFill>
-        <a:ln w="12700" cap="flat" cmpd="sng" algn="ctr">
-          <a:solidFill>
-            <a:schemeClr val="lt1">
-              <a:hueOff val="0"/>
-              <a:satOff val="0"/>
-              <a:lumOff val="0"/>
-              <a:alphaOff val="0"/>
-            </a:schemeClr>
-          </a:solidFill>
-          <a:prstDash val="solid"/>
-          <a:miter lim="800000"/>
-        </a:ln>
-        <a:effectLst/>
-      </dsp:spPr>
-      <dsp:style>
-        <a:lnRef idx="2">
-          <a:scrgbClr r="0" g="0" b="0"/>
-        </a:lnRef>
-        <a:fillRef idx="1">
-          <a:scrgbClr r="0" g="0" b="0"/>
-        </a:fillRef>
-        <a:effectRef idx="0">
-          <a:scrgbClr r="0" g="0" b="0"/>
-        </a:effectRef>
-        <a:fontRef idx="minor">
-          <a:schemeClr val="lt1"/>
-        </a:fontRef>
-      </dsp:style>
-      <dsp:txBody>
-        <a:bodyPr spcFirstLastPara="0" vert="horz" wrap="square" lIns="125730" tIns="125730" rIns="125730" bIns="125730" numCol="1" spcCol="1270" anchor="ctr" anchorCtr="0">
-          <a:noAutofit/>
-        </a:bodyPr>
-        <a:lstStyle/>
-        <a:p>
-          <a:pPr lvl="0" algn="ctr" defTabSz="1466850">
-            <a:lnSpc>
-              <a:spcPct val="90000"/>
-            </a:lnSpc>
-            <a:spcBef>
-              <a:spcPct val="0"/>
-            </a:spcBef>
-            <a:spcAft>
-              <a:spcPct val="35000"/>
-            </a:spcAft>
-          </a:pPr>
-          <a:r>
-            <a:rPr lang="fr-FR" sz="3300" kern="1200" dirty="0" err="1" smtClean="0"/>
-            <a:t>Users</a:t>
-          </a:r>
-          <a:endParaRPr lang="fr-FR" sz="3300" kern="1200" dirty="0"/>
-        </a:p>
-      </dsp:txBody>
-      <dsp:txXfrm rot="-5400000">
-        <a:off x="2962418" y="2018030"/>
-        <a:ext cx="1202866" cy="1382606"/>
-      </dsp:txXfrm>
-    </dsp:sp>
-    <dsp:sp modelId="{E3A5AACA-178D-4285-84FB-67ADE469D2C5}">
-      <dsp:nvSpPr>
-        <dsp:cNvPr id="0" name=""/>
-        <dsp:cNvSpPr/>
-      </dsp:nvSpPr>
-      <dsp:spPr>
-        <a:xfrm>
-          <a:off x="448468" y="2106744"/>
-          <a:ext cx="2169318" cy="1205177"/>
-        </a:xfrm>
-        <a:prstGeom prst="rect">
-          <a:avLst/>
-        </a:prstGeom>
-        <a:noFill/>
-        <a:ln>
-          <a:noFill/>
-        </a:ln>
-        <a:effectLst/>
-      </dsp:spPr>
-      <dsp:style>
-        <a:lnRef idx="0">
-          <a:scrgbClr r="0" g="0" b="0"/>
-        </a:lnRef>
-        <a:fillRef idx="0">
-          <a:scrgbClr r="0" g="0" b="0"/>
-        </a:fillRef>
-        <a:effectRef idx="0">
-          <a:scrgbClr r="0" g="0" b="0"/>
-        </a:effectRef>
-        <a:fontRef idx="minor"/>
-      </dsp:style>
-    </dsp:sp>
-    <dsp:sp modelId="{57517D59-F7A6-4CD2-B00F-2D22FF56E4F8}">
-      <dsp:nvSpPr>
-        <dsp:cNvPr id="0" name=""/>
-        <dsp:cNvSpPr/>
-      </dsp:nvSpPr>
-      <dsp:spPr>
-        <a:xfrm rot="5400000">
-          <a:off x="4446844" y="1835580"/>
-          <a:ext cx="2008628" cy="1747506"/>
-        </a:xfrm>
-        <a:prstGeom prst="hexagon">
-          <a:avLst>
-            <a:gd name="adj" fmla="val 25000"/>
-            <a:gd name="vf" fmla="val 115470"/>
-          </a:avLst>
-        </a:prstGeom>
-        <a:solidFill>
-          <a:schemeClr val="accent3">
-            <a:hueOff val="1626359"/>
-            <a:satOff val="60000"/>
-            <a:lumOff val="-8824"/>
-            <a:alphaOff val="0"/>
-          </a:schemeClr>
-        </a:solidFill>
-        <a:ln w="12700" cap="flat" cmpd="sng" algn="ctr">
-          <a:solidFill>
-            <a:schemeClr val="lt1">
-              <a:hueOff val="0"/>
-              <a:satOff val="0"/>
-              <a:lumOff val="0"/>
-              <a:alphaOff val="0"/>
-            </a:schemeClr>
-          </a:solidFill>
-          <a:prstDash val="solid"/>
-          <a:miter lim="800000"/>
-        </a:ln>
-        <a:effectLst/>
-      </dsp:spPr>
-      <dsp:style>
-        <a:lnRef idx="2">
-          <a:scrgbClr r="0" g="0" b="0"/>
-        </a:lnRef>
-        <a:fillRef idx="1">
-          <a:scrgbClr r="0" g="0" b="0"/>
-        </a:fillRef>
-        <a:effectRef idx="0">
-          <a:scrgbClr r="0" g="0" b="0"/>
-        </a:effectRef>
-        <a:fontRef idx="minor">
-          <a:schemeClr val="lt1"/>
-        </a:fontRef>
-      </dsp:style>
-      <dsp:txBody>
-        <a:bodyPr spcFirstLastPara="0" vert="horz" wrap="square" lIns="0" tIns="0" rIns="0" bIns="0" numCol="1" spcCol="1270" anchor="ctr" anchorCtr="0">
-          <a:noAutofit/>
-        </a:bodyPr>
-        <a:lstStyle/>
-        <a:p>
-          <a:pPr lvl="0" algn="ctr" defTabSz="1600200">
-            <a:lnSpc>
-              <a:spcPct val="90000"/>
-            </a:lnSpc>
-            <a:spcBef>
-              <a:spcPct val="0"/>
-            </a:spcBef>
-            <a:spcAft>
-              <a:spcPct val="35000"/>
-            </a:spcAft>
-          </a:pPr>
-          <a:r>
-            <a:rPr lang="fr-FR" sz="3600" kern="1200" dirty="0" smtClean="0"/>
-            <a:t>Wiki</a:t>
-          </a:r>
-          <a:endParaRPr lang="fr-FR" sz="3600" kern="1200" dirty="0"/>
-        </a:p>
-      </dsp:txBody>
-      <dsp:txXfrm rot="-5400000">
-        <a:off x="4849725" y="2018030"/>
-        <a:ext cx="1202866" cy="1382606"/>
-      </dsp:txXfrm>
-    </dsp:sp>
-    <dsp:sp modelId="{106A2CA3-7E4C-478B-B22F-73C9FA44F51C}">
-      <dsp:nvSpPr>
-        <dsp:cNvPr id="0" name=""/>
-        <dsp:cNvSpPr/>
-      </dsp:nvSpPr>
-      <dsp:spPr>
-        <a:xfrm rot="5400000">
-          <a:off x="3506806" y="3540503"/>
-          <a:ext cx="2008628" cy="1747506"/>
-        </a:xfrm>
-        <a:prstGeom prst="hexagon">
-          <a:avLst>
-            <a:gd name="adj" fmla="val 25000"/>
-            <a:gd name="vf" fmla="val 115470"/>
-          </a:avLst>
-        </a:prstGeom>
-        <a:solidFill>
-          <a:schemeClr val="accent3">
-            <a:hueOff val="2168479"/>
-            <a:satOff val="80000"/>
-            <a:lumOff val="-11765"/>
-            <a:alphaOff val="0"/>
-          </a:schemeClr>
-        </a:solidFill>
-        <a:ln w="12700" cap="flat" cmpd="sng" algn="ctr">
-          <a:solidFill>
-            <a:schemeClr val="lt1">
-              <a:hueOff val="0"/>
-              <a:satOff val="0"/>
-              <a:lumOff val="0"/>
-              <a:alphaOff val="0"/>
-            </a:schemeClr>
-          </a:solidFill>
-          <a:prstDash val="solid"/>
-          <a:miter lim="800000"/>
-        </a:ln>
-        <a:effectLst/>
-      </dsp:spPr>
-      <dsp:style>
-        <a:lnRef idx="2">
-          <a:scrgbClr r="0" g="0" b="0"/>
-        </a:lnRef>
-        <a:fillRef idx="1">
-          <a:scrgbClr r="0" g="0" b="0"/>
-        </a:fillRef>
-        <a:effectRef idx="0">
-          <a:scrgbClr r="0" g="0" b="0"/>
-        </a:effectRef>
-        <a:fontRef idx="minor">
-          <a:schemeClr val="lt1"/>
-        </a:fontRef>
-      </dsp:style>
-      <dsp:txBody>
-        <a:bodyPr spcFirstLastPara="0" vert="horz" wrap="square" lIns="125730" tIns="125730" rIns="125730" bIns="125730" numCol="1" spcCol="1270" anchor="ctr" anchorCtr="0">
-          <a:noAutofit/>
-        </a:bodyPr>
-        <a:lstStyle/>
-        <a:p>
-          <a:pPr lvl="0" algn="ctr" defTabSz="1466850">
-            <a:lnSpc>
-              <a:spcPct val="90000"/>
-            </a:lnSpc>
-            <a:spcBef>
-              <a:spcPct val="0"/>
-            </a:spcBef>
-            <a:spcAft>
-              <a:spcPct val="35000"/>
-            </a:spcAft>
-          </a:pPr>
-          <a:r>
-            <a:rPr lang="fr-FR" sz="3300" kern="1200" dirty="0" smtClean="0"/>
-            <a:t>Blog</a:t>
-          </a:r>
-          <a:endParaRPr lang="fr-FR" sz="3300" kern="1200" dirty="0"/>
-        </a:p>
-      </dsp:txBody>
-      <dsp:txXfrm rot="-5400000">
-        <a:off x="3909687" y="3722953"/>
-        <a:ext cx="1202866" cy="1382606"/>
-      </dsp:txXfrm>
-    </dsp:sp>
-    <dsp:sp modelId="{53C6167B-F651-4999-AC2F-6A06940B347A}">
-      <dsp:nvSpPr>
-        <dsp:cNvPr id="0" name=""/>
-        <dsp:cNvSpPr/>
-      </dsp:nvSpPr>
-      <dsp:spPr>
-        <a:xfrm>
-          <a:off x="5437901" y="3811668"/>
-          <a:ext cx="2241629" cy="1205177"/>
-        </a:xfrm>
-        <a:prstGeom prst="rect">
-          <a:avLst/>
-        </a:prstGeom>
-        <a:noFill/>
-        <a:ln>
-          <a:noFill/>
-        </a:ln>
-        <a:effectLst/>
-      </dsp:spPr>
-      <dsp:style>
-        <a:lnRef idx="0">
-          <a:scrgbClr r="0" g="0" b="0"/>
-        </a:lnRef>
-        <a:fillRef idx="0">
-          <a:scrgbClr r="0" g="0" b="0"/>
-        </a:fillRef>
-        <a:effectRef idx="0">
-          <a:scrgbClr r="0" g="0" b="0"/>
-        </a:effectRef>
-        <a:fontRef idx="minor"/>
-      </dsp:style>
-    </dsp:sp>
-    <dsp:sp modelId="{CF96A699-FD4E-4A19-9FCE-AEB727D66134}">
-      <dsp:nvSpPr>
-        <dsp:cNvPr id="0" name=""/>
-        <dsp:cNvSpPr/>
-      </dsp:nvSpPr>
-      <dsp:spPr>
-        <a:xfrm rot="5400000">
-          <a:off x="1619499" y="3540503"/>
-          <a:ext cx="2008628" cy="1747506"/>
-        </a:xfrm>
-        <a:prstGeom prst="hexagon">
-          <a:avLst>
-            <a:gd name="adj" fmla="val 25000"/>
-            <a:gd name="vf" fmla="val 115470"/>
-          </a:avLst>
-        </a:prstGeom>
-        <a:solidFill>
-          <a:schemeClr val="accent3">
-            <a:hueOff val="2710599"/>
-            <a:satOff val="100000"/>
-            <a:lumOff val="-14706"/>
-            <a:alphaOff val="0"/>
-          </a:schemeClr>
-        </a:solidFill>
-        <a:ln w="12700" cap="flat" cmpd="sng" algn="ctr">
-          <a:solidFill>
-            <a:schemeClr val="lt1">
-              <a:hueOff val="0"/>
-              <a:satOff val="0"/>
-              <a:lumOff val="0"/>
-              <a:alphaOff val="0"/>
-            </a:schemeClr>
-          </a:solidFill>
-          <a:prstDash val="solid"/>
-          <a:miter lim="800000"/>
-        </a:ln>
-        <a:effectLst/>
-      </dsp:spPr>
-      <dsp:style>
-        <a:lnRef idx="2">
-          <a:scrgbClr r="0" g="0" b="0"/>
-        </a:lnRef>
-        <a:fillRef idx="1">
-          <a:scrgbClr r="0" g="0" b="0"/>
-        </a:fillRef>
-        <a:effectRef idx="0">
-          <a:scrgbClr r="0" g="0" b="0"/>
-        </a:effectRef>
-        <a:fontRef idx="minor">
-          <a:schemeClr val="lt1"/>
-        </a:fontRef>
-      </dsp:style>
-      <dsp:txBody>
-        <a:bodyPr spcFirstLastPara="0" vert="horz" wrap="square" lIns="0" tIns="0" rIns="0" bIns="0" numCol="1" spcCol="1270" anchor="ctr" anchorCtr="0">
-          <a:noAutofit/>
-        </a:bodyPr>
-        <a:lstStyle/>
-        <a:p>
-          <a:pPr lvl="0" algn="ctr" defTabSz="1600200">
-            <a:lnSpc>
-              <a:spcPct val="90000"/>
-            </a:lnSpc>
-            <a:spcBef>
-              <a:spcPct val="0"/>
-            </a:spcBef>
-            <a:spcAft>
-              <a:spcPct val="35000"/>
-            </a:spcAft>
-          </a:pPr>
-          <a:r>
-            <a:rPr lang="fr-FR" sz="3600" b="0" i="0" kern="1200" dirty="0" smtClean="0"/>
-            <a:t>REST</a:t>
-          </a:r>
-          <a:endParaRPr lang="fr-FR" sz="3600" kern="1200" dirty="0"/>
-        </a:p>
-      </dsp:txBody>
-      <dsp:txXfrm rot="-5400000">
-        <a:off x="2022380" y="3722953"/>
-        <a:ext cx="1202866" cy="1382606"/>
-      </dsp:txXfrm>
-    </dsp:sp>
   </dsp:spTree>
 </dsp:drawing>
 </file>
@@ -3388,7 +2806,7 @@
           <a:p>
             <a:fld id="{640C21D4-18E2-4FC5-B36F-99B346DF1253}" type="datetimeFigureOut">
               <a:rPr lang="fr-FR" smtClean="0"/>
-              <a:t>10/11/2015</a:t>
+              <a:t>19/11/2015</a:t>
             </a:fld>
             <a:endParaRPr lang="fr-FR"/>
           </a:p>
@@ -3558,7 +2976,7 @@
           <a:p>
             <a:fld id="{640C21D4-18E2-4FC5-B36F-99B346DF1253}" type="datetimeFigureOut">
               <a:rPr lang="fr-FR" smtClean="0"/>
-              <a:t>10/11/2015</a:t>
+              <a:t>19/11/2015</a:t>
             </a:fld>
             <a:endParaRPr lang="fr-FR"/>
           </a:p>
@@ -3738,7 +3156,7 @@
           <a:p>
             <a:fld id="{640C21D4-18E2-4FC5-B36F-99B346DF1253}" type="datetimeFigureOut">
               <a:rPr lang="fr-FR" smtClean="0"/>
-              <a:t>10/11/2015</a:t>
+              <a:t>19/11/2015</a:t>
             </a:fld>
             <a:endParaRPr lang="fr-FR"/>
           </a:p>
@@ -3908,7 +3326,7 @@
           <a:p>
             <a:fld id="{640C21D4-18E2-4FC5-B36F-99B346DF1253}" type="datetimeFigureOut">
               <a:rPr lang="fr-FR" smtClean="0"/>
-              <a:t>10/11/2015</a:t>
+              <a:t>19/11/2015</a:t>
             </a:fld>
             <a:endParaRPr lang="fr-FR"/>
           </a:p>
@@ -4154,7 +3572,7 @@
           <a:p>
             <a:fld id="{640C21D4-18E2-4FC5-B36F-99B346DF1253}" type="datetimeFigureOut">
               <a:rPr lang="fr-FR" smtClean="0"/>
-              <a:t>10/11/2015</a:t>
+              <a:t>19/11/2015</a:t>
             </a:fld>
             <a:endParaRPr lang="fr-FR"/>
           </a:p>
@@ -4386,7 +3804,7 @@
           <a:p>
             <a:fld id="{640C21D4-18E2-4FC5-B36F-99B346DF1253}" type="datetimeFigureOut">
               <a:rPr lang="fr-FR" smtClean="0"/>
-              <a:t>10/11/2015</a:t>
+              <a:t>19/11/2015</a:t>
             </a:fld>
             <a:endParaRPr lang="fr-FR"/>
           </a:p>
@@ -4753,7 +4171,7 @@
           <a:p>
             <a:fld id="{640C21D4-18E2-4FC5-B36F-99B346DF1253}" type="datetimeFigureOut">
               <a:rPr lang="fr-FR" smtClean="0"/>
-              <a:t>10/11/2015</a:t>
+              <a:t>19/11/2015</a:t>
             </a:fld>
             <a:endParaRPr lang="fr-FR"/>
           </a:p>
@@ -4871,7 +4289,7 @@
           <a:p>
             <a:fld id="{640C21D4-18E2-4FC5-B36F-99B346DF1253}" type="datetimeFigureOut">
               <a:rPr lang="fr-FR" smtClean="0"/>
-              <a:t>10/11/2015</a:t>
+              <a:t>19/11/2015</a:t>
             </a:fld>
             <a:endParaRPr lang="fr-FR"/>
           </a:p>
@@ -4966,7 +4384,7 @@
           <a:p>
             <a:fld id="{640C21D4-18E2-4FC5-B36F-99B346DF1253}" type="datetimeFigureOut">
               <a:rPr lang="fr-FR" smtClean="0"/>
-              <a:t>10/11/2015</a:t>
+              <a:t>19/11/2015</a:t>
             </a:fld>
             <a:endParaRPr lang="fr-FR"/>
           </a:p>
@@ -5243,7 +4661,7 @@
           <a:p>
             <a:fld id="{640C21D4-18E2-4FC5-B36F-99B346DF1253}" type="datetimeFigureOut">
               <a:rPr lang="fr-FR" smtClean="0"/>
-              <a:t>10/11/2015</a:t>
+              <a:t>19/11/2015</a:t>
             </a:fld>
             <a:endParaRPr lang="fr-FR"/>
           </a:p>
@@ -5496,7 +4914,7 @@
           <a:p>
             <a:fld id="{640C21D4-18E2-4FC5-B36F-99B346DF1253}" type="datetimeFigureOut">
               <a:rPr lang="fr-FR" smtClean="0"/>
-              <a:t>10/11/2015</a:t>
+              <a:t>19/11/2015</a:t>
             </a:fld>
             <a:endParaRPr lang="fr-FR"/>
           </a:p>
@@ -5709,7 +5127,7 @@
           <a:p>
             <a:fld id="{640C21D4-18E2-4FC5-B36F-99B346DF1253}" type="datetimeFigureOut">
               <a:rPr lang="fr-FR" smtClean="0"/>
-              <a:t>10/11/2015</a:t>
+              <a:t>19/11/2015</a:t>
             </a:fld>
             <a:endParaRPr lang="fr-FR"/>
           </a:p>
@@ -6191,7 +5609,7 @@
         <p:spPr>
           <a:xfrm flipV="1">
             <a:off x="2600728" y="1859114"/>
-            <a:ext cx="5581381" cy="2967845"/>
+            <a:ext cx="5581381" cy="2967846"/>
           </a:xfrm>
           <a:prstGeom prst="line">
             <a:avLst/>
@@ -6313,7 +5731,7 @@
         <p:spPr>
           <a:xfrm>
             <a:off x="8182109" y="1674448"/>
-            <a:ext cx="1625188" cy="369332"/>
+            <a:ext cx="1741054" cy="369332"/>
           </a:xfrm>
           <a:prstGeom prst="rect">
             <a:avLst/>
@@ -6328,7 +5746,11 @@
           <a:p>
             <a:r>
               <a:rPr lang="fr-FR" dirty="0" smtClean="0"/>
-              <a:t>Avec Framwork</a:t>
+              <a:t>Avec </a:t>
+            </a:r>
+            <a:r>
+              <a:rPr lang="fr-FR" dirty="0" smtClean="0"/>
+              <a:t>Framework</a:t>
             </a:r>
             <a:endParaRPr lang="fr-FR" dirty="0"/>
           </a:p>
@@ -6343,7 +5765,7 @@
         <p:spPr>
           <a:xfrm>
             <a:off x="8571411" y="4396923"/>
-            <a:ext cx="1609287" cy="369332"/>
+            <a:ext cx="1725152" cy="369332"/>
           </a:xfrm>
           <a:prstGeom prst="rect">
             <a:avLst/>
@@ -6358,7 +5780,11 @@
           <a:p>
             <a:r>
               <a:rPr lang="fr-FR" dirty="0" smtClean="0"/>
-              <a:t>Sans Framwork</a:t>
+              <a:t>Sans </a:t>
+            </a:r>
+            <a:r>
+              <a:rPr lang="fr-FR" dirty="0" smtClean="0"/>
+              <a:t>Framework</a:t>
             </a:r>
             <a:endParaRPr lang="fr-FR" dirty="0"/>
           </a:p>

</xml_diff>